<commit_message>
Implemented listPersonsWithAddresses with jDBI.
</commit_message>
<xml_diff>
--- a/Faggruppemøte 170615-microorm.pptx
+++ b/Faggruppemøte 170615-microorm.pptx
@@ -9775,7 +9775,6 @@
               <a:rPr lang="en-US" dirty="0" smtClean="0"/>
               <a:t> intro</a:t>
             </a:r>
-            <a:endParaRPr lang="en-US" dirty="0" smtClean="0"/>
           </a:p>
           <a:p>
             <a:pPr marL="285750" indent="-285750">
@@ -10449,7 +10448,43 @@
             </a:r>
             <a:r>
               <a:rPr lang="en-US" dirty="0" smtClean="0"/>
-              <a:t> – </a:t>
+              <a:t>, </a:t>
+            </a:r>
+            <a:r>
+              <a:rPr lang="en-US" dirty="0" err="1" smtClean="0"/>
+              <a:t>og</a:t>
+            </a:r>
+            <a:r>
+              <a:rPr lang="en-US" dirty="0" smtClean="0"/>
+              <a:t> </a:t>
+            </a:r>
+            <a:r>
+              <a:rPr lang="en-US" dirty="0" err="1" smtClean="0"/>
+              <a:t>støttes</a:t>
+            </a:r>
+            <a:r>
+              <a:rPr lang="en-US" dirty="0" smtClean="0"/>
+              <a:t> </a:t>
+            </a:r>
+            <a:r>
+              <a:rPr lang="en-US" dirty="0" err="1" smtClean="0"/>
+              <a:t>egentlig</a:t>
+            </a:r>
+            <a:r>
+              <a:rPr lang="en-US" dirty="0" smtClean="0"/>
+              <a:t> </a:t>
+            </a:r>
+            <a:r>
+              <a:rPr lang="en-US" dirty="0" err="1" smtClean="0"/>
+              <a:t>ikke</a:t>
+            </a:r>
+            <a:r>
+              <a:rPr lang="en-US" dirty="0" smtClean="0"/>
+              <a:t> </a:t>
+            </a:r>
+            <a:r>
+              <a:rPr lang="en-US" dirty="0" smtClean="0"/>
+              <a:t>– </a:t>
             </a:r>
             <a:r>
               <a:rPr lang="en-US" dirty="0" err="1" smtClean="0"/>
@@ -10472,9 +10507,10 @@
               <a:t>måter</a:t>
             </a:r>
             <a:r>
-              <a:rPr lang="en-US" dirty="0" smtClean="0"/>
-              <a:t>,</a:t>
-            </a:r>
+              <a:rPr lang="en-US"/>
+              <a:t>;</a:t>
+            </a:r>
+            <a:endParaRPr lang="en-US" dirty="0" smtClean="0"/>
           </a:p>
           <a:p>
             <a:pPr marL="554038" lvl="1" indent="-285750">
@@ -10507,7 +10543,7 @@
               <a:buFont typeface="Arial"/>
               <a:buChar char="•"/>
             </a:pPr>
-            <a:endParaRPr lang="en-US" smtClean="0"/>
+            <a:endParaRPr lang="en-US" dirty="0" smtClean="0"/>
           </a:p>
           <a:p>
             <a:pPr marL="554038" lvl="1" indent="-285750">

</xml_diff>

<commit_message>
Added some slides for Intro, JOOQ, SFM and assignments.
</commit_message>
<xml_diff>
--- a/Faggruppemøte 170615-microorm.pptx
+++ b/Faggruppemøte 170615-microorm.pptx
@@ -5,16 +5,27 @@
     <p:sldMasterId id="2147483648" r:id="rId1"/>
   </p:sldMasterIdLst>
   <p:notesMasterIdLst>
-    <p:notesMasterId r:id="rId6"/>
+    <p:notesMasterId r:id="rId17"/>
   </p:notesMasterIdLst>
   <p:handoutMasterIdLst>
-    <p:handoutMasterId r:id="rId7"/>
+    <p:handoutMasterId r:id="rId18"/>
   </p:handoutMasterIdLst>
   <p:sldIdLst>
     <p:sldId id="256" r:id="rId2"/>
     <p:sldId id="257" r:id="rId3"/>
-    <p:sldId id="258" r:id="rId4"/>
-    <p:sldId id="259" r:id="rId5"/>
+    <p:sldId id="266" r:id="rId4"/>
+    <p:sldId id="267" r:id="rId5"/>
+    <p:sldId id="268" r:id="rId6"/>
+    <p:sldId id="269" r:id="rId7"/>
+    <p:sldId id="258" r:id="rId8"/>
+    <p:sldId id="259" r:id="rId9"/>
+    <p:sldId id="260" r:id="rId10"/>
+    <p:sldId id="261" r:id="rId11"/>
+    <p:sldId id="262" r:id="rId12"/>
+    <p:sldId id="263" r:id="rId13"/>
+    <p:sldId id="264" r:id="rId14"/>
+    <p:sldId id="265" r:id="rId15"/>
+    <p:sldId id="270" r:id="rId16"/>
   </p:sldIdLst>
   <p:sldSz cx="9144000" cy="6858000" type="screen4x3"/>
   <p:notesSz cx="6858000" cy="9144000"/>
@@ -9679,6 +9690,1432 @@
 </p:sld>
 </file>
 
+<file path=ppt/slides/slide10.xml><?xml version="1.0" encoding="utf-8"?>
+<p:sld xmlns:a="http://schemas.openxmlformats.org/drawingml/2006/main" xmlns:r="http://schemas.openxmlformats.org/officeDocument/2006/relationships" xmlns:p="http://schemas.openxmlformats.org/presentationml/2006/main">
+  <p:cSld>
+    <p:spTree>
+      <p:nvGrpSpPr>
+        <p:cNvPr id="1" name=""/>
+        <p:cNvGrpSpPr/>
+        <p:nvPr/>
+      </p:nvGrpSpPr>
+      <p:grpSpPr>
+        <a:xfrm>
+          <a:off x="0" y="0"/>
+          <a:ext cx="0" cy="0"/>
+          <a:chOff x="0" y="0"/>
+          <a:chExt cx="0" cy="0"/>
+        </a:xfrm>
+      </p:grpSpPr>
+      <p:sp>
+        <p:nvSpPr>
+          <p:cNvPr id="2" name="Title 1"/>
+          <p:cNvSpPr>
+            <a:spLocks noGrp="1"/>
+          </p:cNvSpPr>
+          <p:nvPr>
+            <p:ph type="title"/>
+          </p:nvPr>
+        </p:nvSpPr>
+        <p:spPr>
+          <a:xfrm>
+            <a:off x="321623" y="418905"/>
+            <a:ext cx="928057" cy="307777"/>
+          </a:xfrm>
+        </p:spPr>
+        <p:txBody>
+          <a:bodyPr/>
+          <a:lstStyle/>
+          <a:p>
+            <a:r>
+              <a:rPr lang="en-US" dirty="0" err="1" smtClean="0"/>
+              <a:t>JOOQ</a:t>
+            </a:r>
+            <a:r>
+              <a:rPr lang="en-US" dirty="0" smtClean="0"/>
+              <a:t>	</a:t>
+            </a:r>
+            <a:endParaRPr lang="en-US" dirty="0"/>
+          </a:p>
+        </p:txBody>
+      </p:sp>
+      <p:sp>
+        <p:nvSpPr>
+          <p:cNvPr id="3" name="Slide Number Placeholder 2"/>
+          <p:cNvSpPr>
+            <a:spLocks noGrp="1"/>
+          </p:cNvSpPr>
+          <p:nvPr>
+            <p:ph type="sldNum" sz="quarter" idx="10"/>
+          </p:nvPr>
+        </p:nvSpPr>
+        <p:spPr/>
+        <p:txBody>
+          <a:bodyPr/>
+          <a:lstStyle/>
+          <a:p>
+            <a:fld id="{FF67BF5B-7344-D747-A0C2-CBD7B2ACBC85}" type="slidenum">
+              <a:rPr lang="en-US" smtClean="0"/>
+              <a:pPr/>
+              <a:t>10</a:t>
+            </a:fld>
+            <a:endParaRPr lang="en-US" dirty="0"/>
+          </a:p>
+        </p:txBody>
+      </p:sp>
+      <p:sp>
+        <p:nvSpPr>
+          <p:cNvPr id="4" name="Text Placeholder 3"/>
+          <p:cNvSpPr>
+            <a:spLocks noGrp="1"/>
+          </p:cNvSpPr>
+          <p:nvPr>
+            <p:ph type="body" sz="quarter" idx="11"/>
+          </p:nvPr>
+        </p:nvSpPr>
+        <p:spPr>
+          <a:xfrm>
+            <a:off x="330129" y="1262063"/>
+            <a:ext cx="8487218" cy="1643697"/>
+          </a:xfrm>
+        </p:spPr>
+        <p:txBody>
+          <a:bodyPr/>
+          <a:lstStyle/>
+          <a:p>
+            <a:pPr marL="285750" indent="-285750">
+              <a:buFont typeface="Arial"/>
+              <a:buChar char="•"/>
+            </a:pPr>
+            <a:r>
+              <a:rPr lang="en-US" dirty="0"/>
+              <a:t>Querying</a:t>
+            </a:r>
+          </a:p>
+        </p:txBody>
+      </p:sp>
+      <p:pic>
+        <p:nvPicPr>
+          <p:cNvPr id="9" name="Picture 8"/>
+          <p:cNvPicPr>
+            <a:picLocks noChangeAspect="1"/>
+          </p:cNvPicPr>
+          <p:nvPr/>
+        </p:nvPicPr>
+        <p:blipFill>
+          <a:blip r:embed="rId2"/>
+          <a:stretch>
+            <a:fillRect/>
+          </a:stretch>
+        </p:blipFill>
+        <p:spPr>
+          <a:xfrm>
+            <a:off x="1424848" y="2584454"/>
+            <a:ext cx="6109124" cy="2235355"/>
+          </a:xfrm>
+          <a:prstGeom prst="rect">
+            <a:avLst/>
+          </a:prstGeom>
+        </p:spPr>
+      </p:pic>
+    </p:spTree>
+    <p:extLst>
+      <p:ext uri="{BB962C8B-B14F-4D97-AF65-F5344CB8AC3E}">
+        <p14:creationId xmlns:p14="http://schemas.microsoft.com/office/powerpoint/2010/main" val="4061137394"/>
+      </p:ext>
+    </p:extLst>
+  </p:cSld>
+  <p:clrMapOvr>
+    <a:masterClrMapping/>
+  </p:clrMapOvr>
+  <p:transition xmlns:p14="http://schemas.microsoft.com/office/powerpoint/2010/main">
+    <p:fade thruBlk="1"/>
+  </p:transition>
+  <p:timing>
+    <p:tnLst>
+      <p:par>
+        <p:cTn xmlns:p14="http://schemas.microsoft.com/office/powerpoint/2010/main" id="1" dur="indefinite" restart="never" nodeType="tmRoot"/>
+      </p:par>
+    </p:tnLst>
+  </p:timing>
+</p:sld>
+</file>
+
+<file path=ppt/slides/slide11.xml><?xml version="1.0" encoding="utf-8"?>
+<p:sld xmlns:a="http://schemas.openxmlformats.org/drawingml/2006/main" xmlns:r="http://schemas.openxmlformats.org/officeDocument/2006/relationships" xmlns:p="http://schemas.openxmlformats.org/presentationml/2006/main">
+  <p:cSld>
+    <p:spTree>
+      <p:nvGrpSpPr>
+        <p:cNvPr id="1" name=""/>
+        <p:cNvGrpSpPr/>
+        <p:nvPr/>
+      </p:nvGrpSpPr>
+      <p:grpSpPr>
+        <a:xfrm>
+          <a:off x="0" y="0"/>
+          <a:ext cx="0" cy="0"/>
+          <a:chOff x="0" y="0"/>
+          <a:chExt cx="0" cy="0"/>
+        </a:xfrm>
+      </p:grpSpPr>
+      <p:sp>
+        <p:nvSpPr>
+          <p:cNvPr id="2" name="Title 1"/>
+          <p:cNvSpPr>
+            <a:spLocks noGrp="1"/>
+          </p:cNvSpPr>
+          <p:nvPr>
+            <p:ph type="title"/>
+          </p:nvPr>
+        </p:nvSpPr>
+        <p:spPr>
+          <a:xfrm>
+            <a:off x="321623" y="418905"/>
+            <a:ext cx="928057" cy="307777"/>
+          </a:xfrm>
+        </p:spPr>
+        <p:txBody>
+          <a:bodyPr/>
+          <a:lstStyle/>
+          <a:p>
+            <a:r>
+              <a:rPr lang="en-US" dirty="0" err="1" smtClean="0"/>
+              <a:t>JOOQ</a:t>
+            </a:r>
+            <a:r>
+              <a:rPr lang="en-US" dirty="0" smtClean="0"/>
+              <a:t>	</a:t>
+            </a:r>
+            <a:endParaRPr lang="en-US" dirty="0"/>
+          </a:p>
+        </p:txBody>
+      </p:sp>
+      <p:sp>
+        <p:nvSpPr>
+          <p:cNvPr id="3" name="Slide Number Placeholder 2"/>
+          <p:cNvSpPr>
+            <a:spLocks noGrp="1"/>
+          </p:cNvSpPr>
+          <p:nvPr>
+            <p:ph type="sldNum" sz="quarter" idx="10"/>
+          </p:nvPr>
+        </p:nvSpPr>
+        <p:spPr/>
+        <p:txBody>
+          <a:bodyPr/>
+          <a:lstStyle/>
+          <a:p>
+            <a:fld id="{FF67BF5B-7344-D747-A0C2-CBD7B2ACBC85}" type="slidenum">
+              <a:rPr lang="en-US" smtClean="0"/>
+              <a:pPr/>
+              <a:t>11</a:t>
+            </a:fld>
+            <a:endParaRPr lang="en-US" dirty="0"/>
+          </a:p>
+        </p:txBody>
+      </p:sp>
+      <p:sp>
+        <p:nvSpPr>
+          <p:cNvPr id="4" name="Text Placeholder 3"/>
+          <p:cNvSpPr>
+            <a:spLocks noGrp="1"/>
+          </p:cNvSpPr>
+          <p:nvPr>
+            <p:ph type="body" sz="quarter" idx="11"/>
+          </p:nvPr>
+        </p:nvSpPr>
+        <p:spPr>
+          <a:xfrm>
+            <a:off x="330129" y="1262063"/>
+            <a:ext cx="8487218" cy="1643697"/>
+          </a:xfrm>
+        </p:spPr>
+        <p:txBody>
+          <a:bodyPr/>
+          <a:lstStyle/>
+          <a:p>
+            <a:pPr marL="285750" indent="-285750">
+              <a:buFont typeface="Arial"/>
+              <a:buChar char="•"/>
+            </a:pPr>
+            <a:r>
+              <a:rPr lang="en-US" dirty="0"/>
+              <a:t>CRUD</a:t>
+            </a:r>
+          </a:p>
+          <a:p>
+            <a:pPr marL="285750" indent="-285750">
+              <a:buFont typeface="Arial"/>
+              <a:buChar char="•"/>
+            </a:pPr>
+            <a:endParaRPr lang="en-US" dirty="0"/>
+          </a:p>
+          <a:p>
+            <a:endParaRPr lang="en-US" dirty="0"/>
+          </a:p>
+        </p:txBody>
+      </p:sp>
+      <p:pic>
+        <p:nvPicPr>
+          <p:cNvPr id="5" name="Picture 4"/>
+          <p:cNvPicPr>
+            <a:picLocks noChangeAspect="1"/>
+          </p:cNvPicPr>
+          <p:nvPr/>
+        </p:nvPicPr>
+        <p:blipFill>
+          <a:blip r:embed="rId2"/>
+          <a:stretch>
+            <a:fillRect/>
+          </a:stretch>
+        </p:blipFill>
+        <p:spPr>
+          <a:xfrm>
+            <a:off x="1330960" y="2215842"/>
+            <a:ext cx="6185329" cy="3568948"/>
+          </a:xfrm>
+          <a:prstGeom prst="rect">
+            <a:avLst/>
+          </a:prstGeom>
+        </p:spPr>
+      </p:pic>
+    </p:spTree>
+    <p:extLst>
+      <p:ext uri="{BB962C8B-B14F-4D97-AF65-F5344CB8AC3E}">
+        <p14:creationId xmlns:p14="http://schemas.microsoft.com/office/powerpoint/2010/main" val="541783358"/>
+      </p:ext>
+    </p:extLst>
+  </p:cSld>
+  <p:clrMapOvr>
+    <a:masterClrMapping/>
+  </p:clrMapOvr>
+  <p:transition xmlns:p14="http://schemas.microsoft.com/office/powerpoint/2010/main">
+    <p:fade thruBlk="1"/>
+  </p:transition>
+  <p:timing>
+    <p:tnLst>
+      <p:par>
+        <p:cTn xmlns:p14="http://schemas.microsoft.com/office/powerpoint/2010/main" id="1" dur="indefinite" restart="never" nodeType="tmRoot"/>
+      </p:par>
+    </p:tnLst>
+  </p:timing>
+</p:sld>
+</file>
+
+<file path=ppt/slides/slide12.xml><?xml version="1.0" encoding="utf-8"?>
+<p:sld xmlns:a="http://schemas.openxmlformats.org/drawingml/2006/main" xmlns:r="http://schemas.openxmlformats.org/officeDocument/2006/relationships" xmlns:p="http://schemas.openxmlformats.org/presentationml/2006/main">
+  <p:cSld>
+    <p:spTree>
+      <p:nvGrpSpPr>
+        <p:cNvPr id="1" name=""/>
+        <p:cNvGrpSpPr/>
+        <p:nvPr/>
+      </p:nvGrpSpPr>
+      <p:grpSpPr>
+        <a:xfrm>
+          <a:off x="0" y="0"/>
+          <a:ext cx="0" cy="0"/>
+          <a:chOff x="0" y="0"/>
+          <a:chExt cx="0" cy="0"/>
+        </a:xfrm>
+      </p:grpSpPr>
+      <p:sp>
+        <p:nvSpPr>
+          <p:cNvPr id="2" name="Title 1"/>
+          <p:cNvSpPr>
+            <a:spLocks noGrp="1"/>
+          </p:cNvSpPr>
+          <p:nvPr>
+            <p:ph type="title"/>
+          </p:nvPr>
+        </p:nvSpPr>
+        <p:spPr>
+          <a:xfrm>
+            <a:off x="321623" y="418905"/>
+            <a:ext cx="2958174" cy="307777"/>
+          </a:xfrm>
+        </p:spPr>
+        <p:txBody>
+          <a:bodyPr/>
+          <a:lstStyle/>
+          <a:p>
+            <a:r>
+              <a:rPr lang="en-US" dirty="0" err="1" smtClean="0"/>
+              <a:t>Simpleflatmapper</a:t>
+            </a:r>
+            <a:r>
+              <a:rPr lang="en-US" dirty="0" smtClean="0"/>
+              <a:t>	</a:t>
+            </a:r>
+            <a:endParaRPr lang="en-US" dirty="0"/>
+          </a:p>
+        </p:txBody>
+      </p:sp>
+      <p:sp>
+        <p:nvSpPr>
+          <p:cNvPr id="3" name="Slide Number Placeholder 2"/>
+          <p:cNvSpPr>
+            <a:spLocks noGrp="1"/>
+          </p:cNvSpPr>
+          <p:nvPr>
+            <p:ph type="sldNum" sz="quarter" idx="10"/>
+          </p:nvPr>
+        </p:nvSpPr>
+        <p:spPr/>
+        <p:txBody>
+          <a:bodyPr/>
+          <a:lstStyle/>
+          <a:p>
+            <a:fld id="{FF67BF5B-7344-D747-A0C2-CBD7B2ACBC85}" type="slidenum">
+              <a:rPr lang="en-US" smtClean="0"/>
+              <a:pPr/>
+              <a:t>12</a:t>
+            </a:fld>
+            <a:endParaRPr lang="en-US" dirty="0"/>
+          </a:p>
+        </p:txBody>
+      </p:sp>
+      <p:sp>
+        <p:nvSpPr>
+          <p:cNvPr id="4" name="Text Placeholder 3"/>
+          <p:cNvSpPr>
+            <a:spLocks noGrp="1"/>
+          </p:cNvSpPr>
+          <p:nvPr>
+            <p:ph type="body" sz="quarter" idx="11"/>
+          </p:nvPr>
+        </p:nvSpPr>
+        <p:spPr>
+          <a:xfrm>
+            <a:off x="330129" y="1262063"/>
+            <a:ext cx="8487218" cy="4288934"/>
+          </a:xfrm>
+        </p:spPr>
+        <p:txBody>
+          <a:bodyPr/>
+          <a:lstStyle/>
+          <a:p>
+            <a:pPr marL="285750" indent="-285750">
+              <a:buFont typeface="Arial"/>
+              <a:buChar char="•"/>
+            </a:pPr>
+            <a:r>
+              <a:rPr lang="en-US" dirty="0"/>
+              <a:t>Kun </a:t>
+            </a:r>
+            <a:r>
+              <a:rPr lang="en-US" b="1" dirty="0"/>
+              <a:t>les-mapping</a:t>
+            </a:r>
+            <a:r>
+              <a:rPr lang="en-US" dirty="0"/>
+              <a:t>, men også for objekt-relasjoner (1:N etc)</a:t>
+            </a:r>
+          </a:p>
+          <a:p>
+            <a:pPr marL="554038" lvl="1" indent="-285750">
+              <a:buFont typeface="Arial"/>
+              <a:buChar char="•"/>
+            </a:pPr>
+            <a:r>
+              <a:rPr lang="en-US" dirty="0"/>
+              <a:t>ResultSet -&gt; objekt-graf</a:t>
+            </a:r>
+          </a:p>
+          <a:p>
+            <a:pPr marL="285750" indent="-285750">
+              <a:buFont typeface="Arial"/>
+              <a:buChar char="•"/>
+            </a:pPr>
+            <a:r>
+              <a:rPr lang="en-US" dirty="0"/>
+              <a:t>egentlig en invers flatmapper?</a:t>
+            </a:r>
+          </a:p>
+          <a:p>
+            <a:pPr marL="285750" indent="-285750">
+              <a:buFont typeface="Arial"/>
+              <a:buChar char="•"/>
+            </a:pPr>
+            <a:r>
+              <a:rPr lang="en-US" dirty="0"/>
+              <a:t>Stor grad </a:t>
+            </a:r>
+            <a:r>
+              <a:rPr lang="en-US" b="1" dirty="0"/>
+              <a:t>konvensjonsbasert</a:t>
+            </a:r>
+          </a:p>
+          <a:p>
+            <a:pPr marL="554038" lvl="1" indent="-285750">
+              <a:buFont typeface="Arial"/>
+              <a:buChar char="•"/>
+            </a:pPr>
+            <a:r>
+              <a:rPr lang="en-US" dirty="0">
+                <a:hlinkClick r:id="rId2"/>
+              </a:rPr>
+              <a:t>https://github.com/arnaudroger/SimpleFlatMapper/wiki/Property-Mapping</a:t>
+            </a:r>
+            <a:endParaRPr lang="en-US" dirty="0"/>
+          </a:p>
+          <a:p>
+            <a:pPr marL="285750" indent="-285750">
+              <a:buFont typeface="Arial"/>
+              <a:buChar char="•"/>
+            </a:pPr>
+            <a:endParaRPr lang="en-US" dirty="0"/>
+          </a:p>
+          <a:p>
+            <a:pPr marL="285750" indent="-285750">
+              <a:buFont typeface="Arial"/>
+              <a:buChar char="•"/>
+            </a:pPr>
+            <a:endParaRPr lang="en-US" dirty="0"/>
+          </a:p>
+          <a:p>
+            <a:endParaRPr lang="en-US" dirty="0"/>
+          </a:p>
+        </p:txBody>
+      </p:sp>
+    </p:spTree>
+    <p:extLst>
+      <p:ext uri="{BB962C8B-B14F-4D97-AF65-F5344CB8AC3E}">
+        <p14:creationId xmlns:p14="http://schemas.microsoft.com/office/powerpoint/2010/main" val="4194937858"/>
+      </p:ext>
+    </p:extLst>
+  </p:cSld>
+  <p:clrMapOvr>
+    <a:masterClrMapping/>
+  </p:clrMapOvr>
+  <p:transition xmlns:p14="http://schemas.microsoft.com/office/powerpoint/2010/main">
+    <p:fade thruBlk="1"/>
+  </p:transition>
+  <p:timing>
+    <p:tnLst>
+      <p:par>
+        <p:cTn xmlns:p14="http://schemas.microsoft.com/office/powerpoint/2010/main" id="1" dur="indefinite" restart="never" nodeType="tmRoot"/>
+      </p:par>
+    </p:tnLst>
+  </p:timing>
+</p:sld>
+</file>
+
+<file path=ppt/slides/slide13.xml><?xml version="1.0" encoding="utf-8"?>
+<p:sld xmlns:a="http://schemas.openxmlformats.org/drawingml/2006/main" xmlns:r="http://schemas.openxmlformats.org/officeDocument/2006/relationships" xmlns:p="http://schemas.openxmlformats.org/presentationml/2006/main">
+  <p:cSld>
+    <p:spTree>
+      <p:nvGrpSpPr>
+        <p:cNvPr id="1" name=""/>
+        <p:cNvGrpSpPr/>
+        <p:nvPr/>
+      </p:nvGrpSpPr>
+      <p:grpSpPr>
+        <a:xfrm>
+          <a:off x="0" y="0"/>
+          <a:ext cx="0" cy="0"/>
+          <a:chOff x="0" y="0"/>
+          <a:chExt cx="0" cy="0"/>
+        </a:xfrm>
+      </p:grpSpPr>
+      <p:sp>
+        <p:nvSpPr>
+          <p:cNvPr id="2" name="Title 1"/>
+          <p:cNvSpPr>
+            <a:spLocks noGrp="1"/>
+          </p:cNvSpPr>
+          <p:nvPr>
+            <p:ph type="title"/>
+          </p:nvPr>
+        </p:nvSpPr>
+        <p:spPr>
+          <a:xfrm>
+            <a:off x="321623" y="418905"/>
+            <a:ext cx="2958174" cy="307777"/>
+          </a:xfrm>
+        </p:spPr>
+        <p:txBody>
+          <a:bodyPr/>
+          <a:lstStyle/>
+          <a:p>
+            <a:r>
+              <a:rPr lang="en-US" dirty="0" err="1" smtClean="0"/>
+              <a:t>Simpleflatmapper</a:t>
+            </a:r>
+            <a:r>
+              <a:rPr lang="en-US" dirty="0" smtClean="0"/>
+              <a:t>	</a:t>
+            </a:r>
+            <a:endParaRPr lang="en-US" dirty="0"/>
+          </a:p>
+        </p:txBody>
+      </p:sp>
+      <p:sp>
+        <p:nvSpPr>
+          <p:cNvPr id="3" name="Slide Number Placeholder 2"/>
+          <p:cNvSpPr>
+            <a:spLocks noGrp="1"/>
+          </p:cNvSpPr>
+          <p:nvPr>
+            <p:ph type="sldNum" sz="quarter" idx="10"/>
+          </p:nvPr>
+        </p:nvSpPr>
+        <p:spPr/>
+        <p:txBody>
+          <a:bodyPr/>
+          <a:lstStyle/>
+          <a:p>
+            <a:fld id="{FF67BF5B-7344-D747-A0C2-CBD7B2ACBC85}" type="slidenum">
+              <a:rPr lang="en-US" smtClean="0"/>
+              <a:pPr/>
+              <a:t>13</a:t>
+            </a:fld>
+            <a:endParaRPr lang="en-US" dirty="0"/>
+          </a:p>
+        </p:txBody>
+      </p:sp>
+      <p:sp>
+        <p:nvSpPr>
+          <p:cNvPr id="4" name="Text Placeholder 3"/>
+          <p:cNvSpPr>
+            <a:spLocks noGrp="1"/>
+          </p:cNvSpPr>
+          <p:nvPr>
+            <p:ph type="body" sz="quarter" idx="11"/>
+          </p:nvPr>
+        </p:nvSpPr>
+        <p:spPr>
+          <a:xfrm>
+            <a:off x="330129" y="1262063"/>
+            <a:ext cx="8487218" cy="544475"/>
+          </a:xfrm>
+        </p:spPr>
+        <p:txBody>
+          <a:bodyPr/>
+          <a:lstStyle/>
+          <a:p>
+            <a:pPr marL="285750" indent="-285750">
+              <a:buFont typeface="Arial"/>
+              <a:buChar char="•"/>
+            </a:pPr>
+            <a:endParaRPr lang="en-US" dirty="0"/>
+          </a:p>
+          <a:p>
+            <a:pPr marL="285750" indent="-285750">
+              <a:buFont typeface="Arial"/>
+              <a:buChar char="•"/>
+            </a:pPr>
+            <a:endParaRPr lang="en-US" dirty="0"/>
+          </a:p>
+          <a:p>
+            <a:endParaRPr lang="en-US" dirty="0"/>
+          </a:p>
+        </p:txBody>
+      </p:sp>
+      <p:pic>
+        <p:nvPicPr>
+          <p:cNvPr id="5" name="Picture 4"/>
+          <p:cNvPicPr>
+            <a:picLocks noChangeAspect="1"/>
+          </p:cNvPicPr>
+          <p:nvPr/>
+        </p:nvPicPr>
+        <p:blipFill>
+          <a:blip r:embed="rId2"/>
+          <a:stretch>
+            <a:fillRect/>
+          </a:stretch>
+        </p:blipFill>
+        <p:spPr>
+          <a:xfrm>
+            <a:off x="1414911" y="1128384"/>
+            <a:ext cx="6160990" cy="963282"/>
+          </a:xfrm>
+          <a:prstGeom prst="rect">
+            <a:avLst/>
+          </a:prstGeom>
+        </p:spPr>
+      </p:pic>
+      <p:pic>
+        <p:nvPicPr>
+          <p:cNvPr id="6" name="Picture 5"/>
+          <p:cNvPicPr>
+            <a:picLocks noChangeAspect="1"/>
+          </p:cNvPicPr>
+          <p:nvPr/>
+        </p:nvPicPr>
+        <p:blipFill>
+          <a:blip r:embed="rId3"/>
+          <a:stretch>
+            <a:fillRect/>
+          </a:stretch>
+        </p:blipFill>
+        <p:spPr>
+          <a:xfrm>
+            <a:off x="2559335" y="2153030"/>
+            <a:ext cx="3872142" cy="1110325"/>
+          </a:xfrm>
+          <a:prstGeom prst="rect">
+            <a:avLst/>
+          </a:prstGeom>
+        </p:spPr>
+      </p:pic>
+      <p:pic>
+        <p:nvPicPr>
+          <p:cNvPr id="7" name="Picture 6"/>
+          <p:cNvPicPr>
+            <a:picLocks noChangeAspect="1"/>
+          </p:cNvPicPr>
+          <p:nvPr/>
+        </p:nvPicPr>
+        <p:blipFill>
+          <a:blip r:embed="rId4"/>
+          <a:stretch>
+            <a:fillRect/>
+          </a:stretch>
+        </p:blipFill>
+        <p:spPr>
+          <a:xfrm>
+            <a:off x="2772735" y="3710811"/>
+            <a:ext cx="3445343" cy="1268724"/>
+          </a:xfrm>
+          <a:prstGeom prst="rect">
+            <a:avLst/>
+          </a:prstGeom>
+        </p:spPr>
+      </p:pic>
+      <p:pic>
+        <p:nvPicPr>
+          <p:cNvPr id="8" name="Picture 7"/>
+          <p:cNvPicPr>
+            <a:picLocks noChangeAspect="1"/>
+          </p:cNvPicPr>
+          <p:nvPr/>
+        </p:nvPicPr>
+        <p:blipFill>
+          <a:blip r:embed="rId5"/>
+          <a:stretch>
+            <a:fillRect/>
+          </a:stretch>
+        </p:blipFill>
+        <p:spPr>
+          <a:xfrm>
+            <a:off x="2204079" y="5718021"/>
+            <a:ext cx="4582654" cy="407089"/>
+          </a:xfrm>
+          <a:prstGeom prst="rect">
+            <a:avLst/>
+          </a:prstGeom>
+        </p:spPr>
+      </p:pic>
+      <p:cxnSp>
+        <p:nvCxnSpPr>
+          <p:cNvPr id="11" name="Straight Arrow Connector 10"/>
+          <p:cNvCxnSpPr/>
+          <p:nvPr/>
+        </p:nvCxnSpPr>
+        <p:spPr>
+          <a:xfrm>
+            <a:off x="4495406" y="5135493"/>
+            <a:ext cx="0" cy="423316"/>
+          </a:xfrm>
+          <a:prstGeom prst="straightConnector1">
+            <a:avLst/>
+          </a:prstGeom>
+          <a:ln w="28575" cmpd="sng">
+            <a:solidFill>
+              <a:schemeClr val="accent2"/>
+            </a:solidFill>
+            <a:tailEnd type="arrow"/>
+          </a:ln>
+          <a:effectLst/>
+        </p:spPr>
+        <p:style>
+          <a:lnRef idx="2">
+            <a:schemeClr val="accent1"/>
+          </a:lnRef>
+          <a:fillRef idx="0">
+            <a:schemeClr val="accent1"/>
+          </a:fillRef>
+          <a:effectRef idx="1">
+            <a:schemeClr val="accent1"/>
+          </a:effectRef>
+          <a:fontRef idx="minor">
+            <a:schemeClr val="tx1"/>
+          </a:fontRef>
+        </p:style>
+      </p:cxnSp>
+    </p:spTree>
+    <p:extLst>
+      <p:ext uri="{BB962C8B-B14F-4D97-AF65-F5344CB8AC3E}">
+        <p14:creationId xmlns:p14="http://schemas.microsoft.com/office/powerpoint/2010/main" val="1613394511"/>
+      </p:ext>
+    </p:extLst>
+  </p:cSld>
+  <p:clrMapOvr>
+    <a:masterClrMapping/>
+  </p:clrMapOvr>
+  <p:transition xmlns:p14="http://schemas.microsoft.com/office/powerpoint/2010/main">
+    <p:fade thruBlk="1"/>
+  </p:transition>
+  <p:timing>
+    <p:tnLst>
+      <p:par>
+        <p:cTn xmlns:p14="http://schemas.microsoft.com/office/powerpoint/2010/main" id="1" dur="indefinite" restart="never" nodeType="tmRoot"/>
+      </p:par>
+    </p:tnLst>
+  </p:timing>
+</p:sld>
+</file>
+
+<file path=ppt/slides/slide14.xml><?xml version="1.0" encoding="utf-8"?>
+<p:sld xmlns:a="http://schemas.openxmlformats.org/drawingml/2006/main" xmlns:r="http://schemas.openxmlformats.org/officeDocument/2006/relationships" xmlns:p="http://schemas.openxmlformats.org/presentationml/2006/main">
+  <p:cSld>
+    <p:spTree>
+      <p:nvGrpSpPr>
+        <p:cNvPr id="1" name=""/>
+        <p:cNvGrpSpPr/>
+        <p:nvPr/>
+      </p:nvGrpSpPr>
+      <p:grpSpPr>
+        <a:xfrm>
+          <a:off x="0" y="0"/>
+          <a:ext cx="0" cy="0"/>
+          <a:chOff x="0" y="0"/>
+          <a:chExt cx="0" cy="0"/>
+        </a:xfrm>
+      </p:grpSpPr>
+      <p:sp>
+        <p:nvSpPr>
+          <p:cNvPr id="2" name="Title 1"/>
+          <p:cNvSpPr>
+            <a:spLocks noGrp="1"/>
+          </p:cNvSpPr>
+          <p:nvPr>
+            <p:ph type="title"/>
+          </p:nvPr>
+        </p:nvSpPr>
+        <p:spPr>
+          <a:xfrm>
+            <a:off x="321623" y="418905"/>
+            <a:ext cx="1644483" cy="307777"/>
+          </a:xfrm>
+        </p:spPr>
+        <p:txBody>
+          <a:bodyPr/>
+          <a:lstStyle/>
+          <a:p>
+            <a:r>
+              <a:rPr lang="en-US" dirty="0" err="1" smtClean="0"/>
+              <a:t>Oppgaver</a:t>
+            </a:r>
+            <a:r>
+              <a:rPr lang="en-US" dirty="0" smtClean="0"/>
+              <a:t>	</a:t>
+            </a:r>
+            <a:endParaRPr lang="en-US" dirty="0"/>
+          </a:p>
+        </p:txBody>
+      </p:sp>
+      <p:sp>
+        <p:nvSpPr>
+          <p:cNvPr id="3" name="Slide Number Placeholder 2"/>
+          <p:cNvSpPr>
+            <a:spLocks noGrp="1"/>
+          </p:cNvSpPr>
+          <p:nvPr>
+            <p:ph type="sldNum" sz="quarter" idx="10"/>
+          </p:nvPr>
+        </p:nvSpPr>
+        <p:spPr/>
+        <p:txBody>
+          <a:bodyPr/>
+          <a:lstStyle/>
+          <a:p>
+            <a:fld id="{FF67BF5B-7344-D747-A0C2-CBD7B2ACBC85}" type="slidenum">
+              <a:rPr lang="en-US" smtClean="0"/>
+              <a:pPr/>
+              <a:t>14</a:t>
+            </a:fld>
+            <a:endParaRPr lang="en-US" dirty="0"/>
+          </a:p>
+        </p:txBody>
+      </p:sp>
+      <p:sp>
+        <p:nvSpPr>
+          <p:cNvPr id="4" name="Text Placeholder 3"/>
+          <p:cNvSpPr>
+            <a:spLocks noGrp="1"/>
+          </p:cNvSpPr>
+          <p:nvPr>
+            <p:ph type="body" sz="quarter" idx="11"/>
+          </p:nvPr>
+        </p:nvSpPr>
+        <p:spPr>
+          <a:xfrm>
+            <a:off x="330129" y="1262063"/>
+            <a:ext cx="8487218" cy="4288934"/>
+          </a:xfrm>
+        </p:spPr>
+        <p:txBody>
+          <a:bodyPr/>
+          <a:lstStyle/>
+          <a:p>
+            <a:pPr marL="285750" indent="-285750">
+              <a:lnSpc>
+                <a:spcPct val="90000"/>
+              </a:lnSpc>
+              <a:buFont typeface="Arial"/>
+              <a:buChar char="•"/>
+            </a:pPr>
+            <a:r>
+              <a:rPr lang="en-US" sz="1600" dirty="0"/>
+              <a:t>Forberedelser</a:t>
+            </a:r>
+          </a:p>
+          <a:p>
+            <a:pPr marL="554038" lvl="1" indent="-285750">
+              <a:lnSpc>
+                <a:spcPct val="90000"/>
+              </a:lnSpc>
+              <a:buFont typeface="Arial"/>
+              <a:buChar char="•"/>
+            </a:pPr>
+            <a:r>
+              <a:rPr lang="en-US" sz="1400" dirty="0"/>
+              <a:t>git clone </a:t>
+            </a:r>
+            <a:r>
+              <a:rPr lang="en-US" sz="1400" dirty="0">
+                <a:hlinkClick r:id="rId2"/>
+              </a:rPr>
+              <a:t>git@github.com:Robert-Larsen/java-microorm.git</a:t>
+            </a:r>
+            <a:endParaRPr lang="en-US" sz="1400" dirty="0"/>
+          </a:p>
+          <a:p>
+            <a:pPr marL="554038" lvl="1" indent="-285750">
+              <a:lnSpc>
+                <a:spcPct val="90000"/>
+              </a:lnSpc>
+              <a:buFont typeface="Arial"/>
+              <a:buChar char="•"/>
+            </a:pPr>
+            <a:r>
+              <a:rPr lang="en-US" sz="1400" dirty="0"/>
+              <a:t>mvn install</a:t>
+            </a:r>
+          </a:p>
+          <a:p>
+            <a:pPr marL="554038" lvl="1" indent="-285750">
+              <a:lnSpc>
+                <a:spcPct val="90000"/>
+              </a:lnSpc>
+              <a:buFont typeface="Arial"/>
+              <a:buChar char="•"/>
+            </a:pPr>
+            <a:r>
+              <a:rPr lang="en-US" sz="1400" dirty="0"/>
+              <a:t>Importer til valfri IDE</a:t>
+            </a:r>
+          </a:p>
+          <a:p>
+            <a:pPr marL="554038" lvl="1" indent="-285750">
+              <a:lnSpc>
+                <a:spcPct val="90000"/>
+              </a:lnSpc>
+              <a:buFont typeface="Arial"/>
+              <a:buChar char="•"/>
+            </a:pPr>
+            <a:endParaRPr lang="en-US" sz="1400" dirty="0"/>
+          </a:p>
+          <a:p>
+            <a:pPr marL="285750" indent="-285750">
+              <a:lnSpc>
+                <a:spcPct val="90000"/>
+              </a:lnSpc>
+              <a:buFont typeface="Arial"/>
+              <a:buChar char="•"/>
+            </a:pPr>
+            <a:r>
+              <a:rPr lang="en-US" sz="1600" dirty="0"/>
+              <a:t>Enkle oppgaver</a:t>
+            </a:r>
+          </a:p>
+          <a:p>
+            <a:pPr marL="554038" lvl="1" indent="-285750">
+              <a:lnSpc>
+                <a:spcPct val="90000"/>
+              </a:lnSpc>
+              <a:buFont typeface="Arial"/>
+              <a:buChar char="•"/>
+            </a:pPr>
+            <a:r>
+              <a:rPr lang="en-US" sz="1400" dirty="0"/>
+              <a:t>Les-mapping (inkl. 1:N-relasjon)</a:t>
+            </a:r>
+          </a:p>
+          <a:p>
+            <a:pPr marL="554038" lvl="1" indent="-285750">
+              <a:lnSpc>
+                <a:spcPct val="90000"/>
+              </a:lnSpc>
+              <a:buFont typeface="Arial"/>
+              <a:buChar char="•"/>
+            </a:pPr>
+            <a:r>
+              <a:rPr lang="en-US" sz="1400" dirty="0"/>
+              <a:t>Skriv-mapping</a:t>
+            </a:r>
+          </a:p>
+          <a:p>
+            <a:pPr marL="554038" lvl="1" indent="-285750">
+              <a:lnSpc>
+                <a:spcPct val="90000"/>
+              </a:lnSpc>
+              <a:buFont typeface="Arial"/>
+              <a:buChar char="•"/>
+            </a:pPr>
+            <a:r>
+              <a:rPr lang="en-US" sz="1400" dirty="0"/>
+              <a:t>Dynamisk select</a:t>
+            </a:r>
+          </a:p>
+          <a:p>
+            <a:pPr lvl="1">
+              <a:lnSpc>
+                <a:spcPct val="90000"/>
+              </a:lnSpc>
+            </a:pPr>
+            <a:endParaRPr lang="en-US" sz="1100" dirty="0"/>
+          </a:p>
+          <a:p>
+            <a:pPr marL="285750" indent="-285750">
+              <a:lnSpc>
+                <a:spcPct val="90000"/>
+              </a:lnSpc>
+              <a:buFont typeface="Arial"/>
+              <a:buChar char="•"/>
+            </a:pPr>
+            <a:r>
+              <a:rPr lang="en-US" sz="1600" dirty="0"/>
+              <a:t>Datamodell  (se klasse Testdata for detaljer)</a:t>
+            </a:r>
+          </a:p>
+          <a:p>
+            <a:pPr marL="554038" lvl="1" indent="-285750">
+              <a:lnSpc>
+                <a:spcPct val="90000"/>
+              </a:lnSpc>
+              <a:buFont typeface="Arial"/>
+              <a:buChar char="•"/>
+            </a:pPr>
+            <a:r>
+              <a:rPr lang="en-US" sz="1400" dirty="0"/>
+              <a:t>Database:  p</a:t>
+            </a:r>
+            <a:r>
+              <a:rPr lang="en-US" sz="1400" dirty="0"/>
+              <a:t>erson  </a:t>
+            </a:r>
+            <a:r>
+              <a:rPr lang="en-US" sz="1400" dirty="0">
+                <a:sym typeface="Wingdings"/>
+              </a:rPr>
+              <a:t> </a:t>
+            </a:r>
+            <a:r>
+              <a:rPr lang="en-US" sz="1400" dirty="0"/>
+              <a:t> person_address  </a:t>
+            </a:r>
+            <a:r>
+              <a:rPr lang="en-US" sz="1400" dirty="0">
+                <a:sym typeface="Wingdings"/>
+              </a:rPr>
+              <a:t>   </a:t>
+            </a:r>
+            <a:r>
+              <a:rPr lang="en-US" sz="1400" dirty="0"/>
+              <a:t>address</a:t>
+            </a:r>
+          </a:p>
+          <a:p>
+            <a:pPr marL="554038" lvl="1" indent="-285750">
+              <a:lnSpc>
+                <a:spcPct val="90000"/>
+              </a:lnSpc>
+              <a:buFont typeface="Arial"/>
+              <a:buChar char="•"/>
+            </a:pPr>
+            <a:r>
+              <a:rPr lang="en-US" sz="1400" dirty="0"/>
+              <a:t>Java: </a:t>
+            </a:r>
+          </a:p>
+          <a:p>
+            <a:pPr marL="820737" lvl="2" indent="-285750">
+              <a:lnSpc>
+                <a:spcPct val="90000"/>
+              </a:lnSpc>
+              <a:buFont typeface="Arial"/>
+              <a:buChar char="•"/>
+            </a:pPr>
+            <a:r>
+              <a:rPr lang="en-US" sz="1400" dirty="0"/>
+              <a:t>Person.java</a:t>
+            </a:r>
+          </a:p>
+          <a:p>
+            <a:pPr marL="820737" lvl="2" indent="-285750">
+              <a:lnSpc>
+                <a:spcPct val="90000"/>
+              </a:lnSpc>
+              <a:buFont typeface="Arial"/>
+              <a:buChar char="•"/>
+            </a:pPr>
+            <a:r>
+              <a:rPr lang="en-US" sz="1400" dirty="0"/>
+              <a:t>Address.java</a:t>
+            </a:r>
+          </a:p>
+          <a:p>
+            <a:pPr marL="554038" lvl="1" indent="-285750">
+              <a:lnSpc>
+                <a:spcPct val="90000"/>
+              </a:lnSpc>
+              <a:buFont typeface="Arial"/>
+              <a:buChar char="•"/>
+            </a:pPr>
+            <a:endParaRPr lang="en-US" sz="1400" dirty="0"/>
+          </a:p>
+          <a:p>
+            <a:pPr marL="285750" indent="-285750">
+              <a:lnSpc>
+                <a:spcPct val="90000"/>
+              </a:lnSpc>
+              <a:buFont typeface="Arial"/>
+              <a:buChar char="•"/>
+            </a:pPr>
+            <a:endParaRPr lang="en-US" sz="1600" dirty="0"/>
+          </a:p>
+          <a:p>
+            <a:pPr>
+              <a:lnSpc>
+                <a:spcPct val="90000"/>
+              </a:lnSpc>
+            </a:pPr>
+            <a:endParaRPr lang="en-US" sz="1600" dirty="0"/>
+          </a:p>
+        </p:txBody>
+      </p:sp>
+    </p:spTree>
+    <p:extLst>
+      <p:ext uri="{BB962C8B-B14F-4D97-AF65-F5344CB8AC3E}">
+        <p14:creationId xmlns:p14="http://schemas.microsoft.com/office/powerpoint/2010/main" val="867509726"/>
+      </p:ext>
+    </p:extLst>
+  </p:cSld>
+  <p:clrMapOvr>
+    <a:masterClrMapping/>
+  </p:clrMapOvr>
+  <p:transition xmlns:p14="http://schemas.microsoft.com/office/powerpoint/2010/main">
+    <p:fade thruBlk="1"/>
+  </p:transition>
+  <p:timing>
+    <p:tnLst>
+      <p:par>
+        <p:cTn xmlns:p14="http://schemas.microsoft.com/office/powerpoint/2010/main" id="1" dur="indefinite" restart="never" nodeType="tmRoot"/>
+      </p:par>
+    </p:tnLst>
+  </p:timing>
+</p:sld>
+</file>
+
+<file path=ppt/slides/slide15.xml><?xml version="1.0" encoding="utf-8"?>
+<p:sld xmlns:a="http://schemas.openxmlformats.org/drawingml/2006/main" xmlns:r="http://schemas.openxmlformats.org/officeDocument/2006/relationships" xmlns:p="http://schemas.openxmlformats.org/presentationml/2006/main">
+  <p:cSld>
+    <p:spTree>
+      <p:nvGrpSpPr>
+        <p:cNvPr id="1" name=""/>
+        <p:cNvGrpSpPr/>
+        <p:nvPr/>
+      </p:nvGrpSpPr>
+      <p:grpSpPr>
+        <a:xfrm>
+          <a:off x="0" y="0"/>
+          <a:ext cx="0" cy="0"/>
+          <a:chOff x="0" y="0"/>
+          <a:chExt cx="0" cy="0"/>
+        </a:xfrm>
+      </p:grpSpPr>
+      <p:sp>
+        <p:nvSpPr>
+          <p:cNvPr id="2" name="Title 1"/>
+          <p:cNvSpPr>
+            <a:spLocks noGrp="1"/>
+          </p:cNvSpPr>
+          <p:nvPr>
+            <p:ph type="title"/>
+          </p:nvPr>
+        </p:nvSpPr>
+        <p:spPr>
+          <a:xfrm>
+            <a:off x="321623" y="418905"/>
+            <a:ext cx="2545280" cy="307777"/>
+          </a:xfrm>
+        </p:spPr>
+        <p:txBody>
+          <a:bodyPr/>
+          <a:lstStyle/>
+          <a:p>
+            <a:r>
+              <a:rPr lang="en-US" dirty="0" err="1" smtClean="0"/>
+              <a:t>Oppgaver FORTS</a:t>
+            </a:r>
+            <a:r>
+              <a:rPr lang="en-US" dirty="0" smtClean="0"/>
+              <a:t>	</a:t>
+            </a:r>
+            <a:endParaRPr lang="en-US" dirty="0"/>
+          </a:p>
+        </p:txBody>
+      </p:sp>
+      <p:sp>
+        <p:nvSpPr>
+          <p:cNvPr id="3" name="Slide Number Placeholder 2"/>
+          <p:cNvSpPr>
+            <a:spLocks noGrp="1"/>
+          </p:cNvSpPr>
+          <p:nvPr>
+            <p:ph type="sldNum" sz="quarter" idx="10"/>
+          </p:nvPr>
+        </p:nvSpPr>
+        <p:spPr/>
+        <p:txBody>
+          <a:bodyPr/>
+          <a:lstStyle/>
+          <a:p>
+            <a:fld id="{FF67BF5B-7344-D747-A0C2-CBD7B2ACBC85}" type="slidenum">
+              <a:rPr lang="en-US" smtClean="0"/>
+              <a:pPr/>
+              <a:t>15</a:t>
+            </a:fld>
+            <a:endParaRPr lang="en-US" dirty="0"/>
+          </a:p>
+        </p:txBody>
+      </p:sp>
+      <p:sp>
+        <p:nvSpPr>
+          <p:cNvPr id="4" name="Text Placeholder 3"/>
+          <p:cNvSpPr>
+            <a:spLocks noGrp="1"/>
+          </p:cNvSpPr>
+          <p:nvPr>
+            <p:ph type="body" sz="quarter" idx="11"/>
+          </p:nvPr>
+        </p:nvSpPr>
+        <p:spPr>
+          <a:xfrm>
+            <a:off x="330129" y="1262063"/>
+            <a:ext cx="8487218" cy="4288934"/>
+          </a:xfrm>
+        </p:spPr>
+        <p:txBody>
+          <a:bodyPr/>
+          <a:lstStyle/>
+          <a:p>
+            <a:pPr marL="285750" indent="-285750">
+              <a:lnSpc>
+                <a:spcPct val="100000"/>
+              </a:lnSpc>
+              <a:buFont typeface="Arial"/>
+              <a:buChar char="•"/>
+            </a:pPr>
+            <a:r>
+              <a:rPr lang="en-US" sz="1600" dirty="0"/>
+              <a:t>Velg oppgave/-r etter intresse.</a:t>
+            </a:r>
+          </a:p>
+          <a:p>
+            <a:pPr marL="554038" lvl="1" indent="-285750">
+              <a:lnSpc>
+                <a:spcPct val="100000"/>
+              </a:lnSpc>
+              <a:buFont typeface="Arial"/>
+              <a:buChar char="•"/>
+            </a:pPr>
+            <a:r>
+              <a:rPr lang="en-US" sz="1400" dirty="0"/>
+              <a:t>Implementer DAO i pakke no.bekk.java.microorm.dao</a:t>
+            </a:r>
+          </a:p>
+          <a:p>
+            <a:pPr marL="554038" lvl="1" indent="-285750">
+              <a:lnSpc>
+                <a:spcPct val="100000"/>
+              </a:lnSpc>
+              <a:buFont typeface="Arial"/>
+              <a:buChar char="•"/>
+            </a:pPr>
+            <a:r>
+              <a:rPr lang="en-US" sz="1400" dirty="0"/>
+              <a:t>Test med</a:t>
+            </a:r>
+          </a:p>
+          <a:p>
+            <a:pPr marL="820737" lvl="2" indent="-285750">
+              <a:lnSpc>
+                <a:spcPct val="100000"/>
+              </a:lnSpc>
+              <a:buFont typeface="Arial"/>
+              <a:buChar char="•"/>
+            </a:pPr>
+            <a:r>
+              <a:rPr lang="en-US" sz="1400" b="1">
+                <a:effectLst/>
+              </a:rPr>
+              <a:t>JdbiAssignmentsTest</a:t>
+            </a:r>
+          </a:p>
+          <a:p>
+            <a:pPr marL="820737" lvl="2" indent="-285750">
+              <a:lnSpc>
+                <a:spcPct val="100000"/>
+              </a:lnSpc>
+              <a:buFont typeface="Arial"/>
+              <a:buChar char="•"/>
+            </a:pPr>
+            <a:r>
+              <a:rPr lang="en-US" sz="1400" b="1"/>
+              <a:t>JooqAssignmentsTest</a:t>
+            </a:r>
+          </a:p>
+          <a:p>
+            <a:pPr marL="820737" lvl="2" indent="-285750">
+              <a:lnSpc>
+                <a:spcPct val="100000"/>
+              </a:lnSpc>
+              <a:buFont typeface="Arial"/>
+              <a:buChar char="•"/>
+            </a:pPr>
+            <a:r>
+              <a:rPr lang="en-US" sz="1400" b="1" dirty="0"/>
+              <a:t>SFMAssignmentsTest</a:t>
+            </a:r>
+            <a:r>
+              <a:rPr lang="en-US" sz="1400" dirty="0"/>
+              <a:t>  (SimpleFlatmapper)</a:t>
+            </a:r>
+          </a:p>
+          <a:p>
+            <a:pPr marL="820737" lvl="2" indent="-285750">
+              <a:lnSpc>
+                <a:spcPct val="100000"/>
+              </a:lnSpc>
+              <a:buFont typeface="Arial"/>
+              <a:buChar char="•"/>
+            </a:pPr>
+            <a:r>
+              <a:rPr lang="en-US" sz="1400" b="1"/>
+              <a:t>SpringJdbcTemplateAssignmentsTest</a:t>
+            </a:r>
+          </a:p>
+          <a:p>
+            <a:pPr marL="554038" lvl="1" indent="-285750">
+              <a:lnSpc>
+                <a:spcPct val="100000"/>
+              </a:lnSpc>
+              <a:buFont typeface="Arial"/>
+              <a:buChar char="•"/>
+            </a:pPr>
+            <a:r>
+              <a:rPr lang="en-US" sz="1400" dirty="0"/>
+              <a:t>Fungerende implementasjoner finnes under pakke reference (klass: ReferenceXXX)</a:t>
+            </a:r>
+          </a:p>
+          <a:p>
+            <a:pPr marL="554038" lvl="1" indent="-285750">
+              <a:lnSpc>
+                <a:spcPct val="100000"/>
+              </a:lnSpc>
+              <a:buFont typeface="Arial"/>
+              <a:buChar char="•"/>
+            </a:pPr>
+            <a:endParaRPr lang="en-US" sz="1400"/>
+          </a:p>
+          <a:p>
+            <a:pPr marL="554038" lvl="1" indent="-285750">
+              <a:lnSpc>
+                <a:spcPct val="100000"/>
+              </a:lnSpc>
+              <a:buFont typeface="Arial"/>
+              <a:buChar char="•"/>
+            </a:pPr>
+            <a:endParaRPr lang="en-US" sz="1400" dirty="0"/>
+          </a:p>
+          <a:p>
+            <a:pPr marL="554038" lvl="1" indent="-285750">
+              <a:lnSpc>
+                <a:spcPct val="100000"/>
+              </a:lnSpc>
+              <a:buFont typeface="Arial"/>
+              <a:buChar char="•"/>
+            </a:pPr>
+            <a:endParaRPr lang="en-US" sz="1400" dirty="0"/>
+          </a:p>
+          <a:p>
+            <a:pPr marL="554038" lvl="1" indent="-285750">
+              <a:lnSpc>
+                <a:spcPct val="100000"/>
+              </a:lnSpc>
+              <a:buFont typeface="Arial"/>
+              <a:buChar char="•"/>
+            </a:pPr>
+            <a:endParaRPr lang="en-US" sz="1400" dirty="0"/>
+          </a:p>
+          <a:p>
+            <a:pPr marL="285750" indent="-285750">
+              <a:lnSpc>
+                <a:spcPct val="100000"/>
+              </a:lnSpc>
+              <a:buFont typeface="Arial"/>
+              <a:buChar char="•"/>
+            </a:pPr>
+            <a:endParaRPr lang="en-US" sz="1600" dirty="0"/>
+          </a:p>
+          <a:p>
+            <a:pPr>
+              <a:lnSpc>
+                <a:spcPct val="100000"/>
+              </a:lnSpc>
+            </a:pPr>
+            <a:endParaRPr lang="en-US" sz="1600" dirty="0"/>
+          </a:p>
+        </p:txBody>
+      </p:sp>
+    </p:spTree>
+    <p:extLst>
+      <p:ext uri="{BB962C8B-B14F-4D97-AF65-F5344CB8AC3E}">
+        <p14:creationId xmlns:p14="http://schemas.microsoft.com/office/powerpoint/2010/main" val="316716324"/>
+      </p:ext>
+    </p:extLst>
+  </p:cSld>
+  <p:clrMapOvr>
+    <a:masterClrMapping/>
+  </p:clrMapOvr>
+  <p:transition xmlns:p14="http://schemas.microsoft.com/office/powerpoint/2010/main">
+    <p:fade thruBlk="1"/>
+  </p:transition>
+  <p:timing>
+    <p:tnLst>
+      <p:par>
+        <p:cTn xmlns:p14="http://schemas.microsoft.com/office/powerpoint/2010/main" id="1" dur="indefinite" restart="never" nodeType="tmRoot"/>
+      </p:par>
+    </p:tnLst>
+  </p:timing>
+</p:sld>
+</file>
+
 <file path=ppt/slides/slide2.xml><?xml version="1.0" encoding="utf-8"?>
 <p:sld xmlns:a="http://schemas.openxmlformats.org/drawingml/2006/main" xmlns:r="http://schemas.openxmlformats.org/officeDocument/2006/relationships" xmlns:p="http://schemas.openxmlformats.org/presentationml/2006/main">
   <p:cSld>
@@ -9959,7 +11396,7 @@
         <p:spPr>
           <a:xfrm>
             <a:off x="321623" y="418905"/>
-            <a:ext cx="850005" cy="615553"/>
+            <a:ext cx="2643564" cy="307777"/>
           </a:xfrm>
         </p:spPr>
         <p:txBody>
@@ -9967,12 +11404,8 @@
           <a:lstStyle/>
           <a:p>
             <a:r>
-              <a:rPr lang="en-US" dirty="0" err="1" smtClean="0"/>
-              <a:t>jDBI</a:t>
-            </a:r>
-            <a:r>
-              <a:rPr lang="en-US" dirty="0" smtClean="0"/>
-              <a:t>	</a:t>
+              <a:rPr lang="en-US" dirty="0" smtClean="0"/>
+              <a:t>INTRO MICROORM</a:t>
             </a:r>
             <a:endParaRPr lang="en-US" dirty="0"/>
           </a:p>
@@ -10022,37 +11455,104 @@
               <a:buChar char="•"/>
             </a:pPr>
             <a:r>
-              <a:rPr lang="en-US" dirty="0" err="1" smtClean="0"/>
-              <a:t>Abstraherer</a:t>
-            </a:r>
-            <a:r>
-              <a:rPr lang="en-US" dirty="0" smtClean="0"/>
-              <a:t> </a:t>
-            </a:r>
-            <a:r>
-              <a:rPr lang="en-US" dirty="0" err="1" smtClean="0"/>
-              <a:t>vekk</a:t>
-            </a:r>
-            <a:r>
-              <a:rPr lang="en-US" dirty="0" smtClean="0"/>
-              <a:t> </a:t>
-            </a:r>
-            <a:r>
-              <a:rPr lang="en-US" dirty="0" err="1" smtClean="0"/>
-              <a:t>mye</a:t>
-            </a:r>
-            <a:r>
-              <a:rPr lang="en-US" dirty="0" smtClean="0"/>
-              <a:t> </a:t>
-            </a:r>
-            <a:r>
-              <a:rPr lang="en-US" dirty="0" err="1" smtClean="0"/>
-              <a:t>fra</a:t>
-            </a:r>
-            <a:r>
-              <a:rPr lang="en-US" dirty="0" smtClean="0"/>
-              <a:t> JDBC</a:t>
-            </a:r>
+              <a:rPr lang="en-US" dirty="0" err="1"/>
+              <a:t>Kort: </a:t>
+            </a:r>
+            <a:r>
+              <a:rPr lang="en-US" b="1" dirty="0" err="1"/>
+              <a:t>Convenience</a:t>
+            </a:r>
+            <a:r>
+              <a:rPr lang="en-US" dirty="0" err="1"/>
+              <a:t>-lag for database-aksess</a:t>
+            </a:r>
+          </a:p>
+          <a:p>
+            <a:pPr marL="554038" lvl="1" indent="-285750">
+              <a:buFont typeface="Arial"/>
+              <a:buChar char="•"/>
+            </a:pPr>
+            <a:r>
+              <a:rPr lang="en-US" dirty="0" err="1"/>
+              <a:t>Reduser boilerplate, men ha kontroll</a:t>
+            </a:r>
+          </a:p>
+          <a:p>
+            <a:pPr marL="285750" indent="-285750">
+              <a:buFont typeface="Arial"/>
+              <a:buChar char="•"/>
+            </a:pPr>
+            <a:r>
+              <a:rPr lang="en-US" dirty="0" err="1" smtClean="0"/>
+              <a:t>Motreaksjon mot standard ORM-pattern (Hibernate etc)</a:t>
+            </a:r>
+          </a:p>
+          <a:p>
+            <a:pPr marL="554038" lvl="1" indent="-285750">
+              <a:buFont typeface="Arial"/>
+              <a:buChar char="•"/>
+            </a:pPr>
+            <a:r>
+              <a:rPr lang="en-US" dirty="0" err="1"/>
+              <a:t>Lite kontroll</a:t>
+            </a:r>
+          </a:p>
+          <a:p>
+            <a:pPr marL="554038" lvl="1" indent="-285750">
+              <a:buFont typeface="Arial"/>
+              <a:buChar char="•"/>
+            </a:pPr>
+            <a:r>
+              <a:rPr lang="en-US" dirty="0"/>
+              <a:t>Abstraherar bort sql, men får ett ekstra query-språk på kjøpet</a:t>
+            </a:r>
+          </a:p>
+          <a:p>
+            <a:pPr marL="554038" lvl="1" indent="-285750">
+              <a:buFont typeface="Arial"/>
+              <a:buChar char="•"/>
+            </a:pPr>
+            <a:r>
+              <a:rPr lang="en-US" dirty="0"/>
+              <a:t>Påvirker i stor grad kode-strukturen (transaction-boundaries + entities =&gt; pain)</a:t>
+            </a:r>
+          </a:p>
+          <a:p>
+            <a:pPr marL="554038" lvl="1" indent="-285750">
+              <a:buFont typeface="Arial"/>
+              <a:buChar char="•"/>
+            </a:pPr>
+            <a:r>
+              <a:rPr lang="en-US" dirty="0"/>
+              <a:t>Lettere å få en monolitt</a:t>
+            </a:r>
+          </a:p>
+          <a:p>
+            <a:pPr marL="554038" lvl="1" indent="-285750">
+              <a:buFont typeface="Arial"/>
+              <a:buChar char="•"/>
+            </a:pPr>
+            <a:r>
+              <a:rPr lang="en-US" dirty="0"/>
+              <a:t>Lettere å bli sloppy. Alt kan ju lazy-loades uansett ++</a:t>
+            </a:r>
+          </a:p>
+          <a:p>
+            <a:pPr marL="554038" lvl="1" indent="-285750">
+              <a:buFont typeface="Arial"/>
+              <a:buChar char="•"/>
+            </a:pPr>
+            <a:r>
+              <a:rPr lang="en-US" i="1" dirty="0"/>
+              <a:t>“it seems like a good idea at first, and by the time the problems become apparent, it's too late to switch away”</a:t>
+            </a:r>
+          </a:p>
+          <a:p>
+            <a:pPr marL="554038" lvl="1" indent="-285750">
+              <a:buFont typeface="Arial"/>
+              <a:buChar char="•"/>
+            </a:pPr>
+            <a:endParaRPr lang="en-US" dirty="0"/>
           </a:p>
           <a:p>
             <a:pPr marL="285750" indent="-285750">
@@ -10061,166 +11561,12 @@
             </a:pPr>
             <a:endParaRPr lang="en-US" dirty="0"/>
           </a:p>
-          <a:p>
-            <a:pPr marL="285750" indent="-285750">
-              <a:buFont typeface="Arial"/>
-              <a:buChar char="•"/>
-            </a:pPr>
-            <a:r>
-              <a:rPr lang="en-US" dirty="0" smtClean="0"/>
-              <a:t>ORM, men </a:t>
-            </a:r>
-            <a:r>
-              <a:rPr lang="en-US" dirty="0" err="1" smtClean="0"/>
-              <a:t>mer</a:t>
-            </a:r>
-            <a:r>
-              <a:rPr lang="en-US" dirty="0" smtClean="0"/>
-              <a:t> </a:t>
-            </a:r>
-            <a:r>
-              <a:rPr lang="en-US" dirty="0" err="1" smtClean="0"/>
-              <a:t>lav-nivå</a:t>
-            </a:r>
-            <a:r>
-              <a:rPr lang="en-US" dirty="0" smtClean="0"/>
-              <a:t> </a:t>
-            </a:r>
-            <a:r>
-              <a:rPr lang="en-US" dirty="0" err="1" smtClean="0"/>
-              <a:t>enn</a:t>
-            </a:r>
-            <a:r>
-              <a:rPr lang="en-US" dirty="0" smtClean="0"/>
-              <a:t> </a:t>
-            </a:r>
-            <a:r>
-              <a:rPr lang="en-US" dirty="0" err="1" smtClean="0"/>
-              <a:t>f.eks</a:t>
-            </a:r>
-            <a:r>
-              <a:rPr lang="en-US" dirty="0" smtClean="0"/>
-              <a:t>. JPA </a:t>
-            </a:r>
-            <a:r>
-              <a:rPr lang="en-US" dirty="0" err="1" smtClean="0"/>
-              <a:t>og</a:t>
-            </a:r>
-            <a:r>
-              <a:rPr lang="en-US" dirty="0" smtClean="0"/>
-              <a:t> Hibernate</a:t>
-            </a:r>
-          </a:p>
-          <a:p>
-            <a:pPr marL="285750" indent="-285750">
-              <a:buFont typeface="Arial"/>
-              <a:buChar char="•"/>
-            </a:pPr>
-            <a:endParaRPr lang="en-US" dirty="0" smtClean="0"/>
-          </a:p>
-          <a:p>
-            <a:pPr marL="285750" indent="-285750">
-              <a:buFont typeface="Arial"/>
-              <a:buChar char="•"/>
-            </a:pPr>
-            <a:r>
-              <a:rPr lang="en-US" dirty="0" smtClean="0"/>
-              <a:t>2004</a:t>
-            </a:r>
-          </a:p>
-          <a:p>
-            <a:pPr marL="285750" indent="-285750">
-              <a:buFont typeface="Arial"/>
-              <a:buChar char="•"/>
-            </a:pPr>
-            <a:endParaRPr lang="en-US" dirty="0"/>
-          </a:p>
-          <a:p>
-            <a:pPr marL="285750" indent="-285750">
-              <a:buFont typeface="Arial"/>
-              <a:buChar char="•"/>
-            </a:pPr>
-            <a:r>
-              <a:rPr lang="en-US" dirty="0" smtClean="0"/>
-              <a:t>Del </a:t>
-            </a:r>
-            <a:r>
-              <a:rPr lang="en-US" dirty="0" err="1" smtClean="0"/>
-              <a:t>av</a:t>
-            </a:r>
-            <a:r>
-              <a:rPr lang="en-US" dirty="0" smtClean="0"/>
-              <a:t> </a:t>
-            </a:r>
-            <a:r>
-              <a:rPr lang="en-US" dirty="0" err="1" smtClean="0"/>
-              <a:t>Dropwizard</a:t>
-            </a:r>
-            <a:endParaRPr lang="en-US" dirty="0" smtClean="0"/>
-          </a:p>
-          <a:p>
-            <a:pPr marL="285750" indent="-285750">
-              <a:buFont typeface="Arial"/>
-              <a:buChar char="•"/>
-            </a:pPr>
-            <a:endParaRPr lang="en-US" dirty="0"/>
-          </a:p>
-          <a:p>
-            <a:pPr marL="285750" indent="-285750">
-              <a:buFont typeface="Arial"/>
-              <a:buChar char="•"/>
-            </a:pPr>
-            <a:r>
-              <a:rPr lang="en-US" dirty="0" smtClean="0"/>
-              <a:t>Fluent API </a:t>
-            </a:r>
-          </a:p>
-          <a:p>
-            <a:pPr marL="285750" indent="-285750">
-              <a:buFont typeface="Arial"/>
-              <a:buChar char="•"/>
-            </a:pPr>
-            <a:endParaRPr lang="en-US" dirty="0" smtClean="0"/>
-          </a:p>
-          <a:p>
-            <a:pPr marL="285750" indent="-285750">
-              <a:buFont typeface="Arial"/>
-              <a:buChar char="•"/>
-            </a:pPr>
-            <a:r>
-              <a:rPr lang="en-US" dirty="0" smtClean="0"/>
-              <a:t>SQL Object API (</a:t>
-            </a:r>
-            <a:r>
-              <a:rPr lang="en-US" dirty="0" err="1" smtClean="0"/>
-              <a:t>anbefales</a:t>
-            </a:r>
-            <a:r>
-              <a:rPr lang="en-US" dirty="0" smtClean="0"/>
-              <a:t>)</a:t>
-            </a:r>
-            <a:endParaRPr lang="en-US" dirty="0"/>
-          </a:p>
-          <a:p>
-            <a:pPr marL="285750" indent="-285750">
-              <a:buFont typeface="Arial"/>
-              <a:buChar char="•"/>
-            </a:pPr>
-            <a:endParaRPr lang="en-US" dirty="0"/>
-          </a:p>
-          <a:p>
-            <a:pPr marL="285750" indent="-285750">
-              <a:buFont typeface="Arial"/>
-              <a:buChar char="•"/>
-            </a:pPr>
-            <a:endParaRPr lang="en-US" dirty="0"/>
-          </a:p>
         </p:txBody>
       </p:sp>
     </p:spTree>
     <p:extLst>
       <p:ext uri="{BB962C8B-B14F-4D97-AF65-F5344CB8AC3E}">
-        <p14:creationId xmlns:p14="http://schemas.microsoft.com/office/powerpoint/2010/main" val="1617515534"/>
+        <p14:creationId xmlns:p14="http://schemas.microsoft.com/office/powerpoint/2010/main" val="2569659272"/>
       </p:ext>
     </p:extLst>
   </p:cSld>
@@ -10230,6 +11576,13 @@
   <p:transition xmlns:p14="http://schemas.microsoft.com/office/powerpoint/2010/main">
     <p:fade thruBlk="1"/>
   </p:transition>
+  <p:timing>
+    <p:tnLst>
+      <p:par>
+        <p:cTn xmlns:p14="http://schemas.microsoft.com/office/powerpoint/2010/main" id="1" dur="indefinite" restart="never" nodeType="tmRoot"/>
+      </p:par>
+    </p:tnLst>
+  </p:timing>
 </p:sld>
 </file>
 
@@ -10263,7 +11616,7 @@
         <p:spPr>
           <a:xfrm>
             <a:off x="321623" y="418905"/>
-            <a:ext cx="3005132" cy="307777"/>
+            <a:ext cx="2643564" cy="307777"/>
           </a:xfrm>
         </p:spPr>
         <p:txBody>
@@ -10271,24 +11624,8 @@
           <a:lstStyle/>
           <a:p>
             <a:r>
-              <a:rPr lang="en-US" dirty="0" err="1" smtClean="0"/>
-              <a:t>Gå</a:t>
-            </a:r>
-            <a:r>
-              <a:rPr lang="en-US" dirty="0" smtClean="0"/>
-              <a:t> </a:t>
-            </a:r>
-            <a:r>
-              <a:rPr lang="en-US" dirty="0" err="1" smtClean="0"/>
-              <a:t>videre</a:t>
-            </a:r>
-            <a:r>
-              <a:rPr lang="en-US" dirty="0" smtClean="0"/>
-              <a:t> med </a:t>
-            </a:r>
-            <a:r>
-              <a:rPr lang="en-US" dirty="0" err="1" smtClean="0"/>
-              <a:t>jdbi</a:t>
+              <a:rPr lang="en-US" dirty="0" smtClean="0"/>
+              <a:t>INTRO MICROORM</a:t>
             </a:r>
             <a:endParaRPr lang="en-US" dirty="0"/>
           </a:p>
@@ -10338,52 +11675,76 @@
               <a:buChar char="•"/>
             </a:pPr>
             <a:r>
-              <a:rPr lang="en-US" dirty="0" err="1" smtClean="0"/>
-              <a:t>Prøv</a:t>
-            </a:r>
-            <a:r>
-              <a:rPr lang="en-US" dirty="0" smtClean="0"/>
-              <a:t> </a:t>
-            </a:r>
-            <a:r>
-              <a:rPr lang="en-US" dirty="0" err="1" smtClean="0"/>
-              <a:t>å</a:t>
-            </a:r>
-            <a:r>
-              <a:rPr lang="en-US" dirty="0" smtClean="0"/>
-              <a:t> </a:t>
-            </a:r>
-            <a:r>
-              <a:rPr lang="en-US" dirty="0" err="1" smtClean="0"/>
-              <a:t>løse</a:t>
-            </a:r>
-            <a:r>
-              <a:rPr lang="en-US" dirty="0" smtClean="0"/>
-              <a:t> </a:t>
-            </a:r>
-            <a:r>
-              <a:rPr lang="en-US" dirty="0" err="1" smtClean="0"/>
-              <a:t>oppgavene</a:t>
-            </a:r>
-            <a:r>
-              <a:rPr lang="en-US" dirty="0" smtClean="0"/>
-              <a:t> med </a:t>
-            </a:r>
-            <a:r>
-              <a:rPr lang="en-US" dirty="0" err="1" smtClean="0"/>
-              <a:t>både</a:t>
-            </a:r>
-            <a:r>
-              <a:rPr lang="en-US" dirty="0" smtClean="0"/>
-              <a:t> Fluent API </a:t>
-            </a:r>
-            <a:r>
-              <a:rPr lang="en-US" dirty="0" err="1" smtClean="0"/>
-              <a:t>og</a:t>
-            </a:r>
-            <a:r>
-              <a:rPr lang="en-US" dirty="0" smtClean="0"/>
-              <a:t> SQL Object API</a:t>
+              <a:rPr lang="en-US" dirty="0"/>
+              <a:t>Hva er det fornuftig at en micro-orm tar for seg?</a:t>
+            </a:r>
+          </a:p>
+          <a:p>
+            <a:pPr marL="554038" lvl="1" indent="-285750">
+              <a:buFont typeface="Arial"/>
+              <a:buChar char="•"/>
+            </a:pPr>
+            <a:endParaRPr lang="en-US" dirty="0"/>
+          </a:p>
+          <a:p>
+            <a:pPr marL="554038" lvl="1" indent="-285750">
+              <a:buFont typeface="Arial"/>
+              <a:buChar char="•"/>
+            </a:pPr>
+            <a:r>
+              <a:rPr lang="en-US" dirty="0"/>
+              <a:t>Resurs-håndtering 		(connections, statements, resultsets)</a:t>
+            </a:r>
+          </a:p>
+          <a:p>
+            <a:pPr marL="554038" lvl="1" indent="-285750">
+              <a:buFont typeface="Arial"/>
+              <a:buChar char="•"/>
+            </a:pPr>
+            <a:endParaRPr lang="en-US" dirty="0"/>
+          </a:p>
+          <a:p>
+            <a:pPr marL="554038" lvl="1" indent="-285750">
+              <a:buFont typeface="Arial"/>
+              <a:buChar char="•"/>
+            </a:pPr>
+            <a:r>
+              <a:rPr lang="en-US" dirty="0"/>
+              <a:t>Convenience-querying	(parameter-binding, mapping-helpers)</a:t>
+            </a:r>
+          </a:p>
+          <a:p>
+            <a:pPr marL="554038" lvl="1" indent="-285750">
+              <a:buFont typeface="Arial"/>
+              <a:buChar char="•"/>
+            </a:pPr>
+            <a:endParaRPr lang="en-US" dirty="0"/>
+          </a:p>
+          <a:p>
+            <a:pPr marL="554038" lvl="1" indent="-285750">
+              <a:buFont typeface="Arial"/>
+              <a:buChar char="•"/>
+            </a:pPr>
+            <a:r>
+              <a:rPr lang="en-US" dirty="0"/>
+              <a:t>Les-mapping			(query-resultat -&gt; objekt)</a:t>
+            </a:r>
+          </a:p>
+          <a:p>
+            <a:pPr marL="554038" lvl="1" indent="-285750">
+              <a:buFont typeface="Arial"/>
+              <a:buChar char="•"/>
+            </a:pPr>
+            <a:endParaRPr lang="en-US" dirty="0"/>
+          </a:p>
+          <a:p>
+            <a:pPr marL="554038" lvl="1" indent="-285750">
+              <a:buFont typeface="Arial"/>
+              <a:buChar char="•"/>
+            </a:pPr>
+            <a:r>
+              <a:rPr lang="en-US" dirty="0"/>
+              <a:t>Skriv-mapping			(objekt -&gt; insert/update)</a:t>
             </a:r>
           </a:p>
           <a:p>
@@ -10393,12 +11754,898 @@
             </a:pPr>
             <a:endParaRPr lang="en-US" dirty="0"/>
           </a:p>
+        </p:txBody>
+      </p:sp>
+    </p:spTree>
+    <p:extLst>
+      <p:ext uri="{BB962C8B-B14F-4D97-AF65-F5344CB8AC3E}">
+        <p14:creationId xmlns:p14="http://schemas.microsoft.com/office/powerpoint/2010/main" val="2117320011"/>
+      </p:ext>
+    </p:extLst>
+  </p:cSld>
+  <p:clrMapOvr>
+    <a:masterClrMapping/>
+  </p:clrMapOvr>
+  <p:transition xmlns:p14="http://schemas.microsoft.com/office/powerpoint/2010/main">
+    <p:fade thruBlk="1"/>
+  </p:transition>
+  <p:timing>
+    <p:tnLst>
+      <p:par>
+        <p:cTn xmlns:p14="http://schemas.microsoft.com/office/powerpoint/2010/main" id="1" dur="indefinite" restart="never" nodeType="tmRoot"/>
+      </p:par>
+    </p:tnLst>
+  </p:timing>
+</p:sld>
+</file>
+
+<file path=ppt/slides/slide5.xml><?xml version="1.0" encoding="utf-8"?>
+<p:sld xmlns:a="http://schemas.openxmlformats.org/drawingml/2006/main" xmlns:r="http://schemas.openxmlformats.org/officeDocument/2006/relationships" xmlns:p="http://schemas.openxmlformats.org/presentationml/2006/main">
+  <p:cSld>
+    <p:spTree>
+      <p:nvGrpSpPr>
+        <p:cNvPr id="1" name=""/>
+        <p:cNvGrpSpPr/>
+        <p:nvPr/>
+      </p:nvGrpSpPr>
+      <p:grpSpPr>
+        <a:xfrm>
+          <a:off x="0" y="0"/>
+          <a:ext cx="0" cy="0"/>
+          <a:chOff x="0" y="0"/>
+          <a:chExt cx="0" cy="0"/>
+        </a:xfrm>
+      </p:grpSpPr>
+      <p:sp>
+        <p:nvSpPr>
+          <p:cNvPr id="2" name="Title 1"/>
+          <p:cNvSpPr>
+            <a:spLocks noGrp="1"/>
+          </p:cNvSpPr>
+          <p:nvPr>
+            <p:ph type="title"/>
+          </p:nvPr>
+        </p:nvSpPr>
+        <p:spPr>
+          <a:xfrm>
+            <a:off x="321623" y="418905"/>
+            <a:ext cx="2643564" cy="307777"/>
+          </a:xfrm>
+        </p:spPr>
+        <p:txBody>
+          <a:bodyPr/>
+          <a:lstStyle/>
+          <a:p>
+            <a:r>
+              <a:rPr lang="en-US" dirty="0" smtClean="0"/>
+              <a:t>INTRO MICROORM</a:t>
+            </a:r>
+            <a:endParaRPr lang="en-US" dirty="0"/>
+          </a:p>
+        </p:txBody>
+      </p:sp>
+      <p:sp>
+        <p:nvSpPr>
+          <p:cNvPr id="3" name="Slide Number Placeholder 2"/>
+          <p:cNvSpPr>
+            <a:spLocks noGrp="1"/>
+          </p:cNvSpPr>
+          <p:nvPr>
+            <p:ph type="sldNum" sz="quarter" idx="10"/>
+          </p:nvPr>
+        </p:nvSpPr>
+        <p:spPr/>
+        <p:txBody>
+          <a:bodyPr/>
+          <a:lstStyle/>
+          <a:p>
+            <a:fld id="{FF67BF5B-7344-D747-A0C2-CBD7B2ACBC85}" type="slidenum">
+              <a:rPr lang="en-US" smtClean="0"/>
+              <a:pPr/>
+              <a:t>5</a:t>
+            </a:fld>
+            <a:endParaRPr lang="en-US" dirty="0"/>
+          </a:p>
+        </p:txBody>
+      </p:sp>
+      <p:sp>
+        <p:nvSpPr>
+          <p:cNvPr id="4" name="Text Placeholder 3"/>
+          <p:cNvSpPr>
+            <a:spLocks noGrp="1"/>
+          </p:cNvSpPr>
+          <p:nvPr>
+            <p:ph type="body" sz="quarter" idx="11"/>
+          </p:nvPr>
+        </p:nvSpPr>
+        <p:spPr/>
+        <p:txBody>
+          <a:bodyPr/>
+          <a:lstStyle/>
           <a:p>
             <a:pPr marL="285750" indent="-285750">
               <a:buFont typeface="Arial"/>
               <a:buChar char="•"/>
             </a:pPr>
             <a:r>
+              <a:rPr lang="en-US" dirty="0"/>
+              <a:t>Vent litt, er vi ikke tilbake i ORM-land igjen? Viktigt:</a:t>
+            </a:r>
+          </a:p>
+          <a:p>
+            <a:pPr marL="285750" indent="-285750">
+              <a:buFont typeface="Arial"/>
+              <a:buChar char="•"/>
+            </a:pPr>
+            <a:endParaRPr lang="en-US" dirty="0"/>
+          </a:p>
+          <a:p>
+            <a:pPr marL="554038" lvl="1" indent="-285750">
+              <a:buFont typeface="Arial"/>
+              <a:buChar char="•"/>
+            </a:pPr>
+            <a:r>
+              <a:rPr lang="en-US" dirty="0"/>
+              <a:t>Enkelhet</a:t>
+            </a:r>
+          </a:p>
+          <a:p>
+            <a:pPr marL="554038" lvl="1" indent="-285750">
+              <a:buFont typeface="Arial"/>
+              <a:buChar char="•"/>
+            </a:pPr>
+            <a:endParaRPr lang="en-US" dirty="0"/>
+          </a:p>
+          <a:p>
+            <a:pPr marL="554038" lvl="1" indent="-285750">
+              <a:buFont typeface="Arial"/>
+              <a:buChar char="•"/>
+            </a:pPr>
+            <a:r>
+              <a:rPr lang="en-US" dirty="0"/>
+              <a:t>Tydlige grenser</a:t>
+            </a:r>
+          </a:p>
+          <a:p>
+            <a:pPr marL="554038" lvl="1" indent="-285750">
+              <a:buFont typeface="Arial"/>
+              <a:buChar char="•"/>
+            </a:pPr>
+            <a:endParaRPr lang="en-US" dirty="0"/>
+          </a:p>
+          <a:p>
+            <a:pPr marL="554038" lvl="1" indent="-285750">
+              <a:buFont typeface="Arial"/>
+              <a:buChar char="•"/>
+            </a:pPr>
+            <a:r>
+              <a:rPr lang="en-US" dirty="0"/>
+              <a:t>Begrensing i hvor komplekse problemer som kan løses uten hand-koding</a:t>
+            </a:r>
+          </a:p>
+        </p:txBody>
+      </p:sp>
+    </p:spTree>
+    <p:extLst>
+      <p:ext uri="{BB962C8B-B14F-4D97-AF65-F5344CB8AC3E}">
+        <p14:creationId xmlns:p14="http://schemas.microsoft.com/office/powerpoint/2010/main" val="844404615"/>
+      </p:ext>
+    </p:extLst>
+  </p:cSld>
+  <p:clrMapOvr>
+    <a:masterClrMapping/>
+  </p:clrMapOvr>
+  <p:transition xmlns:p14="http://schemas.microsoft.com/office/powerpoint/2010/main">
+    <p:fade thruBlk="1"/>
+  </p:transition>
+  <p:timing>
+    <p:tnLst>
+      <p:par>
+        <p:cTn xmlns:p14="http://schemas.microsoft.com/office/powerpoint/2010/main" id="1" dur="indefinite" restart="never" nodeType="tmRoot"/>
+      </p:par>
+    </p:tnLst>
+  </p:timing>
+</p:sld>
+</file>
+
+<file path=ppt/slides/slide6.xml><?xml version="1.0" encoding="utf-8"?>
+<p:sld xmlns:a="http://schemas.openxmlformats.org/drawingml/2006/main" xmlns:r="http://schemas.openxmlformats.org/officeDocument/2006/relationships" xmlns:p="http://schemas.openxmlformats.org/presentationml/2006/main">
+  <p:cSld>
+    <p:spTree>
+      <p:nvGrpSpPr>
+        <p:cNvPr id="1" name=""/>
+        <p:cNvGrpSpPr/>
+        <p:nvPr/>
+      </p:nvGrpSpPr>
+      <p:grpSpPr>
+        <a:xfrm>
+          <a:off x="0" y="0"/>
+          <a:ext cx="0" cy="0"/>
+          <a:chOff x="0" y="0"/>
+          <a:chExt cx="0" cy="0"/>
+        </a:xfrm>
+      </p:grpSpPr>
+      <p:sp>
+        <p:nvSpPr>
+          <p:cNvPr id="2" name="Title 1"/>
+          <p:cNvSpPr>
+            <a:spLocks noGrp="1"/>
+          </p:cNvSpPr>
+          <p:nvPr>
+            <p:ph type="title"/>
+          </p:nvPr>
+        </p:nvSpPr>
+        <p:spPr>
+          <a:xfrm>
+            <a:off x="321623" y="418905"/>
+            <a:ext cx="2643564" cy="307777"/>
+          </a:xfrm>
+        </p:spPr>
+        <p:txBody>
+          <a:bodyPr/>
+          <a:lstStyle/>
+          <a:p>
+            <a:r>
+              <a:rPr lang="en-US" dirty="0" smtClean="0"/>
+              <a:t>INTRO MICROORM</a:t>
+            </a:r>
+            <a:endParaRPr lang="en-US" dirty="0"/>
+          </a:p>
+        </p:txBody>
+      </p:sp>
+      <p:sp>
+        <p:nvSpPr>
+          <p:cNvPr id="3" name="Slide Number Placeholder 2"/>
+          <p:cNvSpPr>
+            <a:spLocks noGrp="1"/>
+          </p:cNvSpPr>
+          <p:nvPr>
+            <p:ph type="sldNum" sz="quarter" idx="10"/>
+          </p:nvPr>
+        </p:nvSpPr>
+        <p:spPr/>
+        <p:txBody>
+          <a:bodyPr/>
+          <a:lstStyle/>
+          <a:p>
+            <a:fld id="{FF67BF5B-7344-D747-A0C2-CBD7B2ACBC85}" type="slidenum">
+              <a:rPr lang="en-US" smtClean="0"/>
+              <a:pPr/>
+              <a:t>6</a:t>
+            </a:fld>
+            <a:endParaRPr lang="en-US" dirty="0"/>
+          </a:p>
+        </p:txBody>
+      </p:sp>
+      <p:sp>
+        <p:nvSpPr>
+          <p:cNvPr id="4" name="Text Placeholder 3"/>
+          <p:cNvSpPr>
+            <a:spLocks noGrp="1"/>
+          </p:cNvSpPr>
+          <p:nvPr>
+            <p:ph type="body" sz="quarter" idx="11"/>
+          </p:nvPr>
+        </p:nvSpPr>
+        <p:spPr/>
+        <p:txBody>
+          <a:bodyPr/>
+          <a:lstStyle/>
+          <a:p>
+            <a:pPr marL="285750" indent="-285750">
+              <a:buFont typeface="Arial"/>
+              <a:buChar char="•"/>
+            </a:pPr>
+            <a:r>
+              <a:rPr lang="en-US" dirty="0"/>
+              <a:t>“Micro-orms” i Java-land:</a:t>
+            </a:r>
+          </a:p>
+          <a:p>
+            <a:pPr marL="554038" lvl="1" indent="-285750">
+              <a:buFont typeface="Arial"/>
+              <a:buChar char="•"/>
+            </a:pPr>
+            <a:r>
+              <a:rPr lang="en-US" dirty="0"/>
+              <a:t>Spring JdbcTemplate</a:t>
+            </a:r>
+          </a:p>
+          <a:p>
+            <a:pPr marL="554038" lvl="1" indent="-285750">
+              <a:buFont typeface="Arial"/>
+              <a:buChar char="•"/>
+            </a:pPr>
+            <a:r>
+              <a:rPr lang="en-US" dirty="0"/>
+              <a:t>JDBI</a:t>
+            </a:r>
+          </a:p>
+          <a:p>
+            <a:pPr marL="554038" lvl="1" indent="-285750">
+              <a:buFont typeface="Arial"/>
+              <a:buChar char="•"/>
+            </a:pPr>
+            <a:r>
+              <a:rPr lang="en-US" dirty="0"/>
+              <a:t>JOOQ</a:t>
+            </a:r>
+          </a:p>
+          <a:p>
+            <a:pPr marL="554038" lvl="1" indent="-285750">
+              <a:buFont typeface="Arial"/>
+              <a:buChar char="•"/>
+            </a:pPr>
+            <a:r>
+              <a:rPr lang="en-US" dirty="0"/>
+              <a:t>SimpleFlatmapper</a:t>
+            </a:r>
+          </a:p>
+          <a:p>
+            <a:pPr marL="554038" lvl="1" indent="-285750">
+              <a:buFont typeface="Arial"/>
+              <a:buChar char="•"/>
+            </a:pPr>
+            <a:r>
+              <a:rPr lang="en-US" dirty="0"/>
+              <a:t>SansORM  (fra mannen bak HikariCP)</a:t>
+            </a:r>
+          </a:p>
+          <a:p>
+            <a:pPr marL="554038" lvl="1" indent="-285750">
+              <a:buFont typeface="Arial"/>
+              <a:buChar char="•"/>
+            </a:pPr>
+            <a:r>
+              <a:rPr lang="en-US" dirty="0"/>
+              <a:t>OrmLite</a:t>
+            </a:r>
+          </a:p>
+          <a:p>
+            <a:pPr marL="554038" lvl="1" indent="-285750">
+              <a:buFont typeface="Arial"/>
+              <a:buChar char="•"/>
+            </a:pPr>
+            <a:r>
+              <a:rPr lang="en-US" dirty="0"/>
+              <a:t>Mentabean</a:t>
+            </a:r>
+          </a:p>
+          <a:p>
+            <a:pPr marL="554038" lvl="1" indent="-285750">
+              <a:buFont typeface="Arial"/>
+              <a:buChar char="•"/>
+            </a:pPr>
+            <a:r>
+              <a:rPr lang="en-US" dirty="0"/>
+              <a:t>Jodd</a:t>
+            </a:r>
+          </a:p>
+          <a:p>
+            <a:pPr marL="554038" lvl="1" indent="-285750">
+              <a:buFont typeface="Arial"/>
+              <a:buChar char="•"/>
+            </a:pPr>
+            <a:r>
+              <a:rPr lang="en-US" dirty="0"/>
+              <a:t>Anorm (Scala, Play-framework)</a:t>
+            </a:r>
+          </a:p>
+          <a:p>
+            <a:pPr marL="554038" lvl="1" indent="-285750">
+              <a:buFont typeface="Arial"/>
+              <a:buChar char="•"/>
+            </a:pPr>
+            <a:r>
+              <a:rPr lang="en-US" dirty="0"/>
+              <a:t>(roll your own …)</a:t>
+            </a:r>
+          </a:p>
+          <a:p>
+            <a:pPr marL="554038" lvl="1" indent="-285750">
+              <a:buFont typeface="Arial"/>
+              <a:buChar char="•"/>
+            </a:pPr>
+            <a:r>
+              <a:rPr lang="en-US" dirty="0"/>
+              <a:t>…</a:t>
+            </a:r>
+          </a:p>
+        </p:txBody>
+      </p:sp>
+    </p:spTree>
+    <p:extLst>
+      <p:ext uri="{BB962C8B-B14F-4D97-AF65-F5344CB8AC3E}">
+        <p14:creationId xmlns:p14="http://schemas.microsoft.com/office/powerpoint/2010/main" val="1724662145"/>
+      </p:ext>
+    </p:extLst>
+  </p:cSld>
+  <p:clrMapOvr>
+    <a:masterClrMapping/>
+  </p:clrMapOvr>
+  <p:transition xmlns:p14="http://schemas.microsoft.com/office/powerpoint/2010/main">
+    <p:fade thruBlk="1"/>
+  </p:transition>
+  <p:timing>
+    <p:tnLst>
+      <p:par>
+        <p:cTn xmlns:p14="http://schemas.microsoft.com/office/powerpoint/2010/main" id="1" dur="indefinite" restart="never" nodeType="tmRoot"/>
+      </p:par>
+    </p:tnLst>
+  </p:timing>
+</p:sld>
+</file>
+
+<file path=ppt/slides/slide7.xml><?xml version="1.0" encoding="utf-8"?>
+<p:sld xmlns:a="http://schemas.openxmlformats.org/drawingml/2006/main" xmlns:r="http://schemas.openxmlformats.org/officeDocument/2006/relationships" xmlns:p="http://schemas.openxmlformats.org/presentationml/2006/main">
+  <p:cSld>
+    <p:spTree>
+      <p:nvGrpSpPr>
+        <p:cNvPr id="1" name=""/>
+        <p:cNvGrpSpPr/>
+        <p:nvPr/>
+      </p:nvGrpSpPr>
+      <p:grpSpPr>
+        <a:xfrm>
+          <a:off x="0" y="0"/>
+          <a:ext cx="0" cy="0"/>
+          <a:chOff x="0" y="0"/>
+          <a:chExt cx="0" cy="0"/>
+        </a:xfrm>
+      </p:grpSpPr>
+      <p:sp>
+        <p:nvSpPr>
+          <p:cNvPr id="2" name="Title 1"/>
+          <p:cNvSpPr>
+            <a:spLocks noGrp="1"/>
+          </p:cNvSpPr>
+          <p:nvPr>
+            <p:ph type="title"/>
+          </p:nvPr>
+        </p:nvSpPr>
+        <p:spPr>
+          <a:xfrm>
+            <a:off x="321623" y="418905"/>
+            <a:ext cx="850005" cy="615553"/>
+          </a:xfrm>
+        </p:spPr>
+        <p:txBody>
+          <a:bodyPr/>
+          <a:lstStyle/>
+          <a:p>
+            <a:r>
+              <a:rPr lang="en-US" dirty="0" err="1" smtClean="0"/>
+              <a:t>jDBI</a:t>
+            </a:r>
+            <a:r>
+              <a:rPr lang="en-US" dirty="0" smtClean="0"/>
+              <a:t>	</a:t>
+            </a:r>
+            <a:endParaRPr lang="en-US" dirty="0"/>
+          </a:p>
+        </p:txBody>
+      </p:sp>
+      <p:sp>
+        <p:nvSpPr>
+          <p:cNvPr id="3" name="Slide Number Placeholder 2"/>
+          <p:cNvSpPr>
+            <a:spLocks noGrp="1"/>
+          </p:cNvSpPr>
+          <p:nvPr>
+            <p:ph type="sldNum" sz="quarter" idx="10"/>
+          </p:nvPr>
+        </p:nvSpPr>
+        <p:spPr/>
+        <p:txBody>
+          <a:bodyPr/>
+          <a:lstStyle/>
+          <a:p>
+            <a:fld id="{FF67BF5B-7344-D747-A0C2-CBD7B2ACBC85}" type="slidenum">
+              <a:rPr lang="en-US" smtClean="0"/>
+              <a:pPr/>
+              <a:t>7</a:t>
+            </a:fld>
+            <a:endParaRPr lang="en-US" dirty="0"/>
+          </a:p>
+        </p:txBody>
+      </p:sp>
+      <p:sp>
+        <p:nvSpPr>
+          <p:cNvPr id="4" name="Text Placeholder 3"/>
+          <p:cNvSpPr>
+            <a:spLocks noGrp="1"/>
+          </p:cNvSpPr>
+          <p:nvPr>
+            <p:ph type="body" sz="quarter" idx="11"/>
+          </p:nvPr>
+        </p:nvSpPr>
+        <p:spPr/>
+        <p:txBody>
+          <a:bodyPr/>
+          <a:lstStyle/>
+          <a:p>
+            <a:pPr marL="285750" indent="-285750">
+              <a:buFont typeface="Arial"/>
+              <a:buChar char="•"/>
+            </a:pPr>
+            <a:r>
+              <a:rPr lang="en-US" dirty="0" err="1" smtClean="0"/>
+              <a:t>Abstraherer</a:t>
+            </a:r>
+            <a:r>
+              <a:rPr lang="en-US" dirty="0" smtClean="0"/>
+              <a:t> </a:t>
+            </a:r>
+            <a:r>
+              <a:rPr lang="en-US" dirty="0" err="1" smtClean="0"/>
+              <a:t>vekk</a:t>
+            </a:r>
+            <a:r>
+              <a:rPr lang="en-US" dirty="0" smtClean="0"/>
+              <a:t> </a:t>
+            </a:r>
+            <a:r>
+              <a:rPr lang="en-US" dirty="0" err="1" smtClean="0"/>
+              <a:t>mye</a:t>
+            </a:r>
+            <a:r>
+              <a:rPr lang="en-US" dirty="0" smtClean="0"/>
+              <a:t> </a:t>
+            </a:r>
+            <a:r>
+              <a:rPr lang="en-US" dirty="0" err="1" smtClean="0"/>
+              <a:t>fra</a:t>
+            </a:r>
+            <a:r>
+              <a:rPr lang="en-US" dirty="0" smtClean="0"/>
+              <a:t> JDBC</a:t>
+            </a:r>
+          </a:p>
+          <a:p>
+            <a:pPr marL="285750" indent="-285750">
+              <a:buFont typeface="Arial"/>
+              <a:buChar char="•"/>
+            </a:pPr>
+            <a:endParaRPr lang="en-US" dirty="0"/>
+          </a:p>
+          <a:p>
+            <a:pPr marL="285750" indent="-285750">
+              <a:buFont typeface="Arial"/>
+              <a:buChar char="•"/>
+            </a:pPr>
+            <a:r>
+              <a:rPr lang="en-US" dirty="0" smtClean="0"/>
+              <a:t>ORM, men </a:t>
+            </a:r>
+            <a:r>
+              <a:rPr lang="en-US" dirty="0" err="1" smtClean="0"/>
+              <a:t>mer</a:t>
+            </a:r>
+            <a:r>
+              <a:rPr lang="en-US" dirty="0" smtClean="0"/>
+              <a:t> </a:t>
+            </a:r>
+            <a:r>
+              <a:rPr lang="en-US" dirty="0" err="1" smtClean="0"/>
+              <a:t>lav-nivå</a:t>
+            </a:r>
+            <a:r>
+              <a:rPr lang="en-US" dirty="0" smtClean="0"/>
+              <a:t> </a:t>
+            </a:r>
+            <a:r>
+              <a:rPr lang="en-US" dirty="0" err="1" smtClean="0"/>
+              <a:t>enn</a:t>
+            </a:r>
+            <a:r>
+              <a:rPr lang="en-US" dirty="0" smtClean="0"/>
+              <a:t> </a:t>
+            </a:r>
+            <a:r>
+              <a:rPr lang="en-US" dirty="0" err="1" smtClean="0"/>
+              <a:t>f.eks</a:t>
+            </a:r>
+            <a:r>
+              <a:rPr lang="en-US" dirty="0" smtClean="0"/>
+              <a:t>. JPA </a:t>
+            </a:r>
+            <a:r>
+              <a:rPr lang="en-US" dirty="0" err="1" smtClean="0"/>
+              <a:t>og</a:t>
+            </a:r>
+            <a:r>
+              <a:rPr lang="en-US" dirty="0" smtClean="0"/>
+              <a:t> Hibernate</a:t>
+            </a:r>
+          </a:p>
+          <a:p>
+            <a:pPr marL="285750" indent="-285750">
+              <a:buFont typeface="Arial"/>
+              <a:buChar char="•"/>
+            </a:pPr>
+            <a:endParaRPr lang="en-US" dirty="0" smtClean="0"/>
+          </a:p>
+          <a:p>
+            <a:pPr marL="285750" indent="-285750">
+              <a:buFont typeface="Arial"/>
+              <a:buChar char="•"/>
+            </a:pPr>
+            <a:r>
+              <a:rPr lang="en-US" dirty="0" smtClean="0"/>
+              <a:t>2004</a:t>
+            </a:r>
+          </a:p>
+          <a:p>
+            <a:pPr marL="285750" indent="-285750">
+              <a:buFont typeface="Arial"/>
+              <a:buChar char="•"/>
+            </a:pPr>
+            <a:endParaRPr lang="en-US" dirty="0"/>
+          </a:p>
+          <a:p>
+            <a:pPr marL="285750" indent="-285750">
+              <a:buFont typeface="Arial"/>
+              <a:buChar char="•"/>
+            </a:pPr>
+            <a:r>
+              <a:rPr lang="en-US" dirty="0" smtClean="0"/>
+              <a:t>Del </a:t>
+            </a:r>
+            <a:r>
+              <a:rPr lang="en-US" dirty="0" err="1" smtClean="0"/>
+              <a:t>av</a:t>
+            </a:r>
+            <a:r>
+              <a:rPr lang="en-US" dirty="0" smtClean="0"/>
+              <a:t> </a:t>
+            </a:r>
+            <a:r>
+              <a:rPr lang="en-US" dirty="0" err="1" smtClean="0"/>
+              <a:t>Dropwizard</a:t>
+            </a:r>
+            <a:endParaRPr lang="en-US" dirty="0" smtClean="0"/>
+          </a:p>
+          <a:p>
+            <a:pPr marL="285750" indent="-285750">
+              <a:buFont typeface="Arial"/>
+              <a:buChar char="•"/>
+            </a:pPr>
+            <a:endParaRPr lang="en-US" dirty="0"/>
+          </a:p>
+          <a:p>
+            <a:pPr marL="285750" indent="-285750">
+              <a:buFont typeface="Arial"/>
+              <a:buChar char="•"/>
+            </a:pPr>
+            <a:r>
+              <a:rPr lang="en-US" dirty="0" smtClean="0"/>
+              <a:t>Fluent API </a:t>
+            </a:r>
+          </a:p>
+          <a:p>
+            <a:pPr marL="285750" indent="-285750">
+              <a:buFont typeface="Arial"/>
+              <a:buChar char="•"/>
+            </a:pPr>
+            <a:endParaRPr lang="en-US" dirty="0" smtClean="0"/>
+          </a:p>
+          <a:p>
+            <a:pPr marL="285750" indent="-285750">
+              <a:buFont typeface="Arial"/>
+              <a:buChar char="•"/>
+            </a:pPr>
+            <a:r>
+              <a:rPr lang="en-US" dirty="0" smtClean="0"/>
+              <a:t>SQL Object API (</a:t>
+            </a:r>
+            <a:r>
+              <a:rPr lang="en-US" dirty="0" err="1" smtClean="0"/>
+              <a:t>anbefales</a:t>
+            </a:r>
+            <a:r>
+              <a:rPr lang="en-US" dirty="0" smtClean="0"/>
+              <a:t>)</a:t>
+            </a:r>
+            <a:endParaRPr lang="en-US" dirty="0"/>
+          </a:p>
+          <a:p>
+            <a:pPr marL="285750" indent="-285750">
+              <a:buFont typeface="Arial"/>
+              <a:buChar char="•"/>
+            </a:pPr>
+            <a:endParaRPr lang="en-US" dirty="0"/>
+          </a:p>
+          <a:p>
+            <a:pPr marL="285750" indent="-285750">
+              <a:buFont typeface="Arial"/>
+              <a:buChar char="•"/>
+            </a:pPr>
+            <a:endParaRPr lang="en-US" dirty="0"/>
+          </a:p>
+        </p:txBody>
+      </p:sp>
+    </p:spTree>
+    <p:extLst>
+      <p:ext uri="{BB962C8B-B14F-4D97-AF65-F5344CB8AC3E}">
+        <p14:creationId xmlns:p14="http://schemas.microsoft.com/office/powerpoint/2010/main" val="1617515534"/>
+      </p:ext>
+    </p:extLst>
+  </p:cSld>
+  <p:clrMapOvr>
+    <a:masterClrMapping/>
+  </p:clrMapOvr>
+  <p:transition xmlns:p14="http://schemas.microsoft.com/office/powerpoint/2010/main">
+    <p:fade thruBlk="1"/>
+  </p:transition>
+</p:sld>
+</file>
+
+<file path=ppt/slides/slide8.xml><?xml version="1.0" encoding="utf-8"?>
+<p:sld xmlns:a="http://schemas.openxmlformats.org/drawingml/2006/main" xmlns:r="http://schemas.openxmlformats.org/officeDocument/2006/relationships" xmlns:p="http://schemas.openxmlformats.org/presentationml/2006/main">
+  <p:cSld>
+    <p:spTree>
+      <p:nvGrpSpPr>
+        <p:cNvPr id="1" name=""/>
+        <p:cNvGrpSpPr/>
+        <p:nvPr/>
+      </p:nvGrpSpPr>
+      <p:grpSpPr>
+        <a:xfrm>
+          <a:off x="0" y="0"/>
+          <a:ext cx="0" cy="0"/>
+          <a:chOff x="0" y="0"/>
+          <a:chExt cx="0" cy="0"/>
+        </a:xfrm>
+      </p:grpSpPr>
+      <p:sp>
+        <p:nvSpPr>
+          <p:cNvPr id="2" name="Title 1"/>
+          <p:cNvSpPr>
+            <a:spLocks noGrp="1"/>
+          </p:cNvSpPr>
+          <p:nvPr>
+            <p:ph type="title"/>
+          </p:nvPr>
+        </p:nvSpPr>
+        <p:spPr>
+          <a:xfrm>
+            <a:off x="321623" y="418905"/>
+            <a:ext cx="3005132" cy="307777"/>
+          </a:xfrm>
+        </p:spPr>
+        <p:txBody>
+          <a:bodyPr/>
+          <a:lstStyle/>
+          <a:p>
+            <a:r>
+              <a:rPr lang="en-US" dirty="0" err="1" smtClean="0"/>
+              <a:t>Gå</a:t>
+            </a:r>
+            <a:r>
+              <a:rPr lang="en-US" dirty="0" smtClean="0"/>
+              <a:t> </a:t>
+            </a:r>
+            <a:r>
+              <a:rPr lang="en-US" dirty="0" err="1" smtClean="0"/>
+              <a:t>videre</a:t>
+            </a:r>
+            <a:r>
+              <a:rPr lang="en-US" dirty="0" smtClean="0"/>
+              <a:t> med </a:t>
+            </a:r>
+            <a:r>
+              <a:rPr lang="en-US" dirty="0" err="1" smtClean="0"/>
+              <a:t>jdbi</a:t>
+            </a:r>
+            <a:endParaRPr lang="en-US" dirty="0"/>
+          </a:p>
+        </p:txBody>
+      </p:sp>
+      <p:sp>
+        <p:nvSpPr>
+          <p:cNvPr id="3" name="Slide Number Placeholder 2"/>
+          <p:cNvSpPr>
+            <a:spLocks noGrp="1"/>
+          </p:cNvSpPr>
+          <p:nvPr>
+            <p:ph type="sldNum" sz="quarter" idx="10"/>
+          </p:nvPr>
+        </p:nvSpPr>
+        <p:spPr/>
+        <p:txBody>
+          <a:bodyPr/>
+          <a:lstStyle/>
+          <a:p>
+            <a:fld id="{FF67BF5B-7344-D747-A0C2-CBD7B2ACBC85}" type="slidenum">
+              <a:rPr lang="en-US" smtClean="0"/>
+              <a:pPr/>
+              <a:t>8</a:t>
+            </a:fld>
+            <a:endParaRPr lang="en-US" dirty="0"/>
+          </a:p>
+        </p:txBody>
+      </p:sp>
+      <p:sp>
+        <p:nvSpPr>
+          <p:cNvPr id="4" name="Text Placeholder 3"/>
+          <p:cNvSpPr>
+            <a:spLocks noGrp="1"/>
+          </p:cNvSpPr>
+          <p:nvPr>
+            <p:ph type="body" sz="quarter" idx="11"/>
+          </p:nvPr>
+        </p:nvSpPr>
+        <p:spPr/>
+        <p:txBody>
+          <a:bodyPr/>
+          <a:lstStyle/>
+          <a:p>
+            <a:pPr marL="285750" indent="-285750">
+              <a:buFont typeface="Arial"/>
+              <a:buChar char="•"/>
+            </a:pPr>
+            <a:r>
+              <a:rPr lang="en-US" dirty="0" err="1" smtClean="0"/>
+              <a:t>Prøv</a:t>
+            </a:r>
+            <a:r>
+              <a:rPr lang="en-US" dirty="0" smtClean="0"/>
+              <a:t> </a:t>
+            </a:r>
+            <a:r>
+              <a:rPr lang="en-US" dirty="0" err="1" smtClean="0"/>
+              <a:t>å</a:t>
+            </a:r>
+            <a:r>
+              <a:rPr lang="en-US" dirty="0" smtClean="0"/>
+              <a:t> </a:t>
+            </a:r>
+            <a:r>
+              <a:rPr lang="en-US" dirty="0" err="1" smtClean="0"/>
+              <a:t>løse</a:t>
+            </a:r>
+            <a:r>
+              <a:rPr lang="en-US" dirty="0" smtClean="0"/>
+              <a:t> </a:t>
+            </a:r>
+            <a:r>
+              <a:rPr lang="en-US" dirty="0" err="1" smtClean="0"/>
+              <a:t>oppgavene</a:t>
+            </a:r>
+            <a:r>
+              <a:rPr lang="en-US" dirty="0" smtClean="0"/>
+              <a:t> med </a:t>
+            </a:r>
+            <a:r>
+              <a:rPr lang="en-US" dirty="0" err="1" smtClean="0"/>
+              <a:t>både</a:t>
+            </a:r>
+            <a:r>
+              <a:rPr lang="en-US" dirty="0" smtClean="0"/>
+              <a:t> Fluent API </a:t>
+            </a:r>
+            <a:r>
+              <a:rPr lang="en-US" dirty="0" err="1" smtClean="0"/>
+              <a:t>og</a:t>
+            </a:r>
+            <a:r>
+              <a:rPr lang="en-US" dirty="0" smtClean="0"/>
+              <a:t> SQL Object API</a:t>
+            </a:r>
+          </a:p>
+          <a:p>
+            <a:pPr marL="285750" indent="-285750">
+              <a:buFont typeface="Arial"/>
+              <a:buChar char="•"/>
+            </a:pPr>
+            <a:endParaRPr lang="en-US" dirty="0"/>
+          </a:p>
+          <a:p>
+            <a:pPr marL="285750" indent="-285750">
+              <a:buFont typeface="Arial"/>
+              <a:buChar char="•"/>
+            </a:pPr>
+            <a:r>
               <a:rPr lang="en-US" dirty="0" smtClean="0"/>
               <a:t>Mapping </a:t>
             </a:r>
@@ -10480,11 +12727,7 @@
             </a:r>
             <a:r>
               <a:rPr lang="en-US" dirty="0" smtClean="0"/>
-              <a:t> </a:t>
-            </a:r>
-            <a:r>
-              <a:rPr lang="en-US" dirty="0" smtClean="0"/>
-              <a:t>– </a:t>
+              <a:t> – </a:t>
             </a:r>
             <a:r>
               <a:rPr lang="en-US" dirty="0" err="1" smtClean="0"/>
@@ -10567,6 +12810,202 @@
   <p:transition xmlns:p14="http://schemas.microsoft.com/office/powerpoint/2010/main">
     <p:fade thruBlk="1"/>
   </p:transition>
+  <p:timing>
+    <p:tnLst>
+      <p:par>
+        <p:cTn xmlns:p14="http://schemas.microsoft.com/office/powerpoint/2010/main" id="1" dur="indefinite" restart="never" nodeType="tmRoot"/>
+      </p:par>
+    </p:tnLst>
+  </p:timing>
+</p:sld>
+</file>
+
+<file path=ppt/slides/slide9.xml><?xml version="1.0" encoding="utf-8"?>
+<p:sld xmlns:a="http://schemas.openxmlformats.org/drawingml/2006/main" xmlns:r="http://schemas.openxmlformats.org/officeDocument/2006/relationships" xmlns:p="http://schemas.openxmlformats.org/presentationml/2006/main">
+  <p:cSld>
+    <p:spTree>
+      <p:nvGrpSpPr>
+        <p:cNvPr id="1" name=""/>
+        <p:cNvGrpSpPr/>
+        <p:nvPr/>
+      </p:nvGrpSpPr>
+      <p:grpSpPr>
+        <a:xfrm>
+          <a:off x="0" y="0"/>
+          <a:ext cx="0" cy="0"/>
+          <a:chOff x="0" y="0"/>
+          <a:chExt cx="0" cy="0"/>
+        </a:xfrm>
+      </p:grpSpPr>
+      <p:sp>
+        <p:nvSpPr>
+          <p:cNvPr id="2" name="Title 1"/>
+          <p:cNvSpPr>
+            <a:spLocks noGrp="1"/>
+          </p:cNvSpPr>
+          <p:nvPr>
+            <p:ph type="title"/>
+          </p:nvPr>
+        </p:nvSpPr>
+        <p:spPr>
+          <a:xfrm>
+            <a:off x="321623" y="418905"/>
+            <a:ext cx="928057" cy="307777"/>
+          </a:xfrm>
+        </p:spPr>
+        <p:txBody>
+          <a:bodyPr/>
+          <a:lstStyle/>
+          <a:p>
+            <a:r>
+              <a:rPr lang="en-US" dirty="0" err="1" smtClean="0"/>
+              <a:t>JOOQ</a:t>
+            </a:r>
+            <a:r>
+              <a:rPr lang="en-US" dirty="0" smtClean="0"/>
+              <a:t>	</a:t>
+            </a:r>
+            <a:endParaRPr lang="en-US" dirty="0"/>
+          </a:p>
+        </p:txBody>
+      </p:sp>
+      <p:sp>
+        <p:nvSpPr>
+          <p:cNvPr id="3" name="Slide Number Placeholder 2"/>
+          <p:cNvSpPr>
+            <a:spLocks noGrp="1"/>
+          </p:cNvSpPr>
+          <p:nvPr>
+            <p:ph type="sldNum" sz="quarter" idx="10"/>
+          </p:nvPr>
+        </p:nvSpPr>
+        <p:spPr/>
+        <p:txBody>
+          <a:bodyPr/>
+          <a:lstStyle/>
+          <a:p>
+            <a:fld id="{FF67BF5B-7344-D747-A0C2-CBD7B2ACBC85}" type="slidenum">
+              <a:rPr lang="en-US" smtClean="0"/>
+              <a:pPr/>
+              <a:t>9</a:t>
+            </a:fld>
+            <a:endParaRPr lang="en-US" dirty="0"/>
+          </a:p>
+        </p:txBody>
+      </p:sp>
+      <p:sp>
+        <p:nvSpPr>
+          <p:cNvPr id="4" name="Text Placeholder 3"/>
+          <p:cNvSpPr>
+            <a:spLocks noGrp="1"/>
+          </p:cNvSpPr>
+          <p:nvPr>
+            <p:ph type="body" sz="quarter" idx="11"/>
+          </p:nvPr>
+        </p:nvSpPr>
+        <p:spPr/>
+        <p:txBody>
+          <a:bodyPr/>
+          <a:lstStyle/>
+          <a:p>
+            <a:pPr marL="285750" indent="-285750">
+              <a:buFont typeface="Arial"/>
+              <a:buChar char="•"/>
+            </a:pPr>
+            <a:r>
+              <a:rPr lang="en-US" dirty="0" err="1" smtClean="0"/>
+              <a:t>“mini-ORM”, men </a:t>
+            </a:r>
+            <a:r>
+              <a:rPr lang="en-US" b="1" dirty="0" err="1" smtClean="0"/>
+              <a:t>database-first</a:t>
+            </a:r>
+          </a:p>
+          <a:p>
+            <a:pPr marL="285750" indent="-285750">
+              <a:buFont typeface="Arial"/>
+              <a:buChar char="•"/>
+            </a:pPr>
+            <a:r>
+              <a:rPr lang="en-US" dirty="0" err="1"/>
+              <a:t>Genererer </a:t>
+            </a:r>
+            <a:r>
+              <a:rPr lang="en-US" b="1" dirty="0" err="1"/>
+              <a:t>statisk</a:t>
+            </a:r>
+            <a:r>
+              <a:rPr lang="en-US" dirty="0" err="1"/>
+              <a:t> Java-modell fra database</a:t>
+            </a:r>
+          </a:p>
+          <a:p>
+            <a:pPr marL="554038" lvl="1" indent="-285750">
+              <a:buFont typeface="Arial"/>
+              <a:buChar char="•"/>
+            </a:pPr>
+            <a:r>
+              <a:rPr lang="en-US" dirty="0" err="1"/>
+              <a:t>“Record”-type</a:t>
+            </a:r>
+          </a:p>
+          <a:p>
+            <a:pPr marL="554038" lvl="1" indent="-285750">
+              <a:buFont typeface="Arial"/>
+              <a:buChar char="•"/>
+            </a:pPr>
+            <a:r>
+              <a:rPr lang="en-US" dirty="0" err="1"/>
+              <a:t>Dao</a:t>
+            </a:r>
+          </a:p>
+          <a:p>
+            <a:pPr marL="285750" indent="-285750">
+              <a:buFont typeface="Arial"/>
+              <a:buChar char="•"/>
+            </a:pPr>
+            <a:r>
+              <a:rPr lang="en-US" dirty="0"/>
+              <a:t>Konsept med </a:t>
+            </a:r>
+            <a:r>
+              <a:rPr lang="en-US" b="1" dirty="0"/>
+              <a:t>"attached" records</a:t>
+            </a:r>
+            <a:r>
+              <a:rPr lang="en-US" dirty="0"/>
+              <a:t>, men ikke knytta til en session som i Hibernate</a:t>
+            </a:r>
+          </a:p>
+          <a:p>
+            <a:pPr marL="285750" indent="-285750">
+              <a:buFont typeface="Arial"/>
+              <a:buChar char="•"/>
+            </a:pPr>
+            <a:endParaRPr lang="en-US" dirty="0"/>
+          </a:p>
+        </p:txBody>
+      </p:sp>
+    </p:spTree>
+    <p:extLst>
+      <p:ext uri="{BB962C8B-B14F-4D97-AF65-F5344CB8AC3E}">
+        <p14:creationId xmlns:p14="http://schemas.microsoft.com/office/powerpoint/2010/main" val="1504673057"/>
+      </p:ext>
+    </p:extLst>
+  </p:cSld>
+  <p:clrMapOvr>
+    <a:masterClrMapping/>
+  </p:clrMapOvr>
+  <p:transition xmlns:p14="http://schemas.microsoft.com/office/powerpoint/2010/main">
+    <p:fade thruBlk="1"/>
+  </p:transition>
+  <p:timing>
+    <p:tnLst>
+      <p:par>
+        <p:cTn xmlns:p14="http://schemas.microsoft.com/office/powerpoint/2010/main" id="1" dur="indefinite" restart="never" nodeType="tmRoot"/>
+      </p:par>
+    </p:tnLst>
+  </p:timing>
 </p:sld>
 </file>
 

</xml_diff>

<commit_message>
Microscopic un-pushed changes to presentation
</commit_message>
<xml_diff>
--- a/Faggruppemøte 170615-microorm.pptx
+++ b/Faggruppemøte 170615-microorm.pptx
@@ -10119,7 +10119,7 @@
             </a:pPr>
             <a:r>
               <a:rPr lang="en-US" dirty="0"/>
-              <a:t>ResultSet -&gt; objekt-graf</a:t>
+              <a:t>Automatisk mapping fra ResultSet til objekter</a:t>
             </a:r>
           </a:p>
           <a:p>
@@ -10946,7 +10946,7 @@
             </a:pPr>
             <a:r>
               <a:rPr lang="en-US" sz="1400" dirty="0"/>
-              <a:t>Implementer DAO i pakke no.bekk.java.microorm.dao</a:t>
+              <a:t>Implementer DAO-er i pakke no.bekk.java.microorm.dao</a:t>
             </a:r>
           </a:p>
           <a:p>
@@ -11693,7 +11693,7 @@
             </a:pPr>
             <a:r>
               <a:rPr lang="en-US" dirty="0"/>
-              <a:t>Resurs-håndtering 		(connections, statements, resultsets)</a:t>
+              <a:t>Resurs-håndtering 		(connections, statements, resultsets …)</a:t>
             </a:r>
           </a:p>
           <a:p>
@@ -11710,7 +11710,7 @@
             </a:pPr>
             <a:r>
               <a:rPr lang="en-US" dirty="0"/>
-              <a:t>Convenience-querying	(parameter-binding, mapping-helpers)</a:t>
+              <a:t>Convenience-querying	(parameter-binding, mapping-helpers …)</a:t>
             </a:r>
           </a:p>
           <a:p>

</xml_diff>